<commit_message>
add modal branching and shuttle to ppt
</commit_message>
<xml_diff>
--- a/project_presentation.pptx
+++ b/project_presentation.pptx
@@ -7331,25 +7331,31 @@
           </a:p>
         </p:txBody>
       </p:sp>
-      <p:sp>
-        <p:nvSpPr>
-          <p:cNvPr id="3" name="Content Placeholder 2"/>
-          <p:cNvSpPr>
-            <a:spLocks noGrp="1"/>
-          </p:cNvSpPr>
+      <p:pic>
+        <p:nvPicPr>
+          <p:cNvPr id="4" name="Content Placeholder 3" descr="Screen Shot 2015-04-29 at 10.55.13 AM.png"/>
+          <p:cNvPicPr>
+            <a:picLocks noGrp="1" noChangeAspect="1"/>
+          </p:cNvPicPr>
           <p:nvPr>
             <p:ph idx="1"/>
           </p:nvPr>
-        </p:nvSpPr>
-        <p:spPr/>
-        <p:txBody>
-          <a:bodyPr/>
-          <a:lstStyle/>
-          <a:p>
-            <a:endParaRPr lang="en-US"/>
-          </a:p>
-        </p:txBody>
-      </p:sp>
+        </p:nvPicPr>
+        <p:blipFill>
+          <a:blip r:embed="rId3">
+            <a:extLst>
+              <a:ext uri="{28A0092B-C50C-407E-A947-70E740481C1C}">
+                <a14:useLocalDpi xmlns:a14="http://schemas.microsoft.com/office/drawing/2010/main" val="0"/>
+              </a:ext>
+            </a:extLst>
+          </a:blip>
+          <a:srcRect t="-57878" b="-57878"/>
+          <a:stretch>
+            <a:fillRect/>
+          </a:stretch>
+        </p:blipFill>
+        <p:spPr/>
+      </p:pic>
     </p:spTree>
     <p:extLst>
       <p:ext uri="{BB962C8B-B14F-4D97-AF65-F5344CB8AC3E}">
@@ -7483,21 +7489,226 @@
           </a:p>
         </p:txBody>
       </p:sp>
-      <p:sp>
-        <p:nvSpPr>
-          <p:cNvPr id="3" name="Content Placeholder 2"/>
-          <p:cNvSpPr>
-            <a:spLocks noGrp="1"/>
-          </p:cNvSpPr>
-          <p:nvPr>
-            <p:ph idx="1"/>
-          </p:nvPr>
-        </p:nvSpPr>
-        <p:spPr/>
-        <p:txBody>
-          <a:bodyPr/>
-          <a:lstStyle/>
-          <a:p>
+      <p:pic>
+        <p:nvPicPr>
+          <p:cNvPr id="6" name="Picture 5" descr="Screen Shot 2015-04-29 at 10.56.21 AM.png"/>
+          <p:cNvPicPr>
+            <a:picLocks noChangeAspect="1"/>
+          </p:cNvPicPr>
+          <p:nvPr/>
+        </p:nvPicPr>
+        <p:blipFill>
+          <a:blip r:embed="rId3">
+            <a:extLst>
+              <a:ext uri="{28A0092B-C50C-407E-A947-70E740481C1C}">
+                <a14:useLocalDpi xmlns:a14="http://schemas.microsoft.com/office/drawing/2010/main" val="0"/>
+              </a:ext>
+            </a:extLst>
+          </a:blip>
+          <a:stretch>
+            <a:fillRect/>
+          </a:stretch>
+        </p:blipFill>
+        <p:spPr>
+          <a:xfrm>
+            <a:off x="457200" y="1524000"/>
+            <a:ext cx="8329596" cy="1982678"/>
+          </a:xfrm>
+          <a:prstGeom prst="rect">
+            <a:avLst/>
+          </a:prstGeom>
+          <a:ln>
+            <a:noFill/>
+          </a:ln>
+          <a:effectLst>
+            <a:outerShdw blurRad="292100" dist="139700" dir="2700000" algn="tl" rotWithShape="0">
+              <a:srgbClr val="333333">
+                <a:alpha val="65000"/>
+              </a:srgbClr>
+            </a:outerShdw>
+          </a:effectLst>
+        </p:spPr>
+      </p:pic>
+      <p:pic>
+        <p:nvPicPr>
+          <p:cNvPr id="7" name="Picture 6" descr="Screen Shot 2015-04-29 at 10.56.35 AM.png"/>
+          <p:cNvPicPr>
+            <a:picLocks noChangeAspect="1"/>
+          </p:cNvPicPr>
+          <p:nvPr/>
+        </p:nvPicPr>
+        <p:blipFill>
+          <a:blip r:embed="rId4">
+            <a:extLst>
+              <a:ext uri="{28A0092B-C50C-407E-A947-70E740481C1C}">
+                <a14:useLocalDpi xmlns:a14="http://schemas.microsoft.com/office/drawing/2010/main" val="0"/>
+              </a:ext>
+            </a:extLst>
+          </a:blip>
+          <a:stretch>
+            <a:fillRect/>
+          </a:stretch>
+        </p:blipFill>
+        <p:spPr>
+          <a:xfrm>
+            <a:off x="505652" y="4426415"/>
+            <a:ext cx="8181148" cy="1486434"/>
+          </a:xfrm>
+          <a:prstGeom prst="rect">
+            <a:avLst/>
+          </a:prstGeom>
+          <a:ln>
+            <a:noFill/>
+          </a:ln>
+          <a:effectLst>
+            <a:outerShdw blurRad="292100" dist="139700" dir="2700000" algn="tl" rotWithShape="0">
+              <a:srgbClr val="333333">
+                <a:alpha val="65000"/>
+              </a:srgbClr>
+            </a:outerShdw>
+          </a:effectLst>
+        </p:spPr>
+      </p:pic>
+      <p:sp>
+        <p:nvSpPr>
+          <p:cNvPr id="8" name="Donut 7"/>
+          <p:cNvSpPr/>
+          <p:nvPr/>
+        </p:nvSpPr>
+        <p:spPr>
+          <a:xfrm>
+            <a:off x="4299780" y="2301559"/>
+            <a:ext cx="1888634" cy="1009367"/>
+          </a:xfrm>
+          <a:prstGeom prst="donut">
+            <a:avLst>
+              <a:gd name="adj" fmla="val 7435"/>
+            </a:avLst>
+          </a:prstGeom>
+          <a:solidFill>
+            <a:schemeClr val="tx1"/>
+          </a:solidFill>
+          <a:ln>
+            <a:noFill/>
+          </a:ln>
+        </p:spPr>
+        <p:style>
+          <a:lnRef idx="1">
+            <a:schemeClr val="accent1"/>
+          </a:lnRef>
+          <a:fillRef idx="3">
+            <a:schemeClr val="accent1"/>
+          </a:fillRef>
+          <a:effectRef idx="2">
+            <a:schemeClr val="accent1"/>
+          </a:effectRef>
+          <a:fontRef idx="minor">
+            <a:schemeClr val="lt1"/>
+          </a:fontRef>
+        </p:style>
+        <p:txBody>
+          <a:bodyPr rtlCol="0" anchor="ctr"/>
+          <a:lstStyle/>
+          <a:p>
+            <a:pPr algn="ctr"/>
+            <a:endParaRPr lang="en-US">
+              <a:solidFill>
+                <a:schemeClr val="tx1"/>
+              </a:solidFill>
+            </a:endParaRPr>
+          </a:p>
+        </p:txBody>
+      </p:sp>
+      <p:sp>
+        <p:nvSpPr>
+          <p:cNvPr id="9" name="Up Arrow 8"/>
+          <p:cNvSpPr/>
+          <p:nvPr/>
+        </p:nvSpPr>
+        <p:spPr>
+          <a:xfrm>
+            <a:off x="7257475" y="3607836"/>
+            <a:ext cx="461839" cy="999865"/>
+          </a:xfrm>
+          <a:prstGeom prst="upArrow">
+            <a:avLst>
+              <a:gd name="adj1" fmla="val 28571"/>
+              <a:gd name="adj2" fmla="val 50000"/>
+            </a:avLst>
+          </a:prstGeom>
+          <a:solidFill>
+            <a:srgbClr val="292934"/>
+          </a:solidFill>
+          <a:ln>
+            <a:noFill/>
+          </a:ln>
+        </p:spPr>
+        <p:style>
+          <a:lnRef idx="1">
+            <a:schemeClr val="accent1"/>
+          </a:lnRef>
+          <a:fillRef idx="3">
+            <a:schemeClr val="accent1"/>
+          </a:fillRef>
+          <a:effectRef idx="2">
+            <a:schemeClr val="accent1"/>
+          </a:effectRef>
+          <a:fontRef idx="minor">
+            <a:schemeClr val="lt1"/>
+          </a:fontRef>
+        </p:style>
+        <p:txBody>
+          <a:bodyPr rtlCol="0" anchor="ctr"/>
+          <a:lstStyle/>
+          <a:p>
+            <a:pPr algn="ctr"/>
+            <a:endParaRPr lang="en-US"/>
+          </a:p>
+        </p:txBody>
+      </p:sp>
+      <p:sp>
+        <p:nvSpPr>
+          <p:cNvPr id="10" name="Up Arrow 9"/>
+          <p:cNvSpPr/>
+          <p:nvPr/>
+        </p:nvSpPr>
+        <p:spPr>
+          <a:xfrm rot="10800000">
+            <a:off x="5030748" y="3310926"/>
+            <a:ext cx="461839" cy="999865"/>
+          </a:xfrm>
+          <a:prstGeom prst="upArrow">
+            <a:avLst>
+              <a:gd name="adj1" fmla="val 28571"/>
+              <a:gd name="adj2" fmla="val 50000"/>
+            </a:avLst>
+          </a:prstGeom>
+          <a:solidFill>
+            <a:srgbClr val="292934"/>
+          </a:solidFill>
+          <a:ln>
+            <a:noFill/>
+          </a:ln>
+        </p:spPr>
+        <p:style>
+          <a:lnRef idx="1">
+            <a:schemeClr val="accent1"/>
+          </a:lnRef>
+          <a:fillRef idx="3">
+            <a:schemeClr val="accent1"/>
+          </a:fillRef>
+          <a:effectRef idx="2">
+            <a:schemeClr val="accent1"/>
+          </a:effectRef>
+          <a:fontRef idx="minor">
+            <a:schemeClr val="lt1"/>
+          </a:fontRef>
+        </p:style>
+        <p:txBody>
+          <a:bodyPr rtlCol="0" anchor="ctr"/>
+          <a:lstStyle/>
+          <a:p>
+            <a:pPr algn="ctr"/>
             <a:endParaRPr lang="en-US"/>
           </a:p>
         </p:txBody>

</xml_diff>

<commit_message>
add some nice drop shadows :D
</commit_message>
<xml_diff>
--- a/project_presentation.pptx
+++ b/project_presentation.pptx
@@ -6258,7 +6258,21 @@
             <a:fillRect/>
           </a:stretch>
         </p:blipFill>
-        <p:spPr/>
+        <p:spPr>
+          <a:prstGeom prst="rect">
+            <a:avLst/>
+          </a:prstGeom>
+          <a:ln>
+            <a:noFill/>
+          </a:ln>
+          <a:effectLst>
+            <a:outerShdw blurRad="292100" dist="139700" dir="2700000" algn="tl" rotWithShape="0">
+              <a:srgbClr val="333333">
+                <a:alpha val="65000"/>
+              </a:srgbClr>
+            </a:outerShdw>
+          </a:effectLst>
+        </p:spPr>
       </p:pic>
       <p:sp>
         <p:nvSpPr>
@@ -6557,7 +6571,21 @@
             <a:fillRect/>
           </a:stretch>
         </p:blipFill>
-        <p:spPr/>
+        <p:spPr>
+          <a:prstGeom prst="rect">
+            <a:avLst/>
+          </a:prstGeom>
+          <a:ln>
+            <a:noFill/>
+          </a:ln>
+          <a:effectLst>
+            <a:outerShdw blurRad="292100" dist="139700" dir="2700000" algn="tl" rotWithShape="0">
+              <a:srgbClr val="333333">
+                <a:alpha val="65000"/>
+              </a:srgbClr>
+            </a:outerShdw>
+          </a:effectLst>
+        </p:spPr>
       </p:pic>
     </p:spTree>
     <p:extLst>
@@ -6877,7 +6905,21 @@
             <a:fillRect/>
           </a:stretch>
         </p:blipFill>
-        <p:spPr/>
+        <p:spPr>
+          <a:prstGeom prst="rect">
+            <a:avLst/>
+          </a:prstGeom>
+          <a:ln>
+            <a:noFill/>
+          </a:ln>
+          <a:effectLst>
+            <a:outerShdw blurRad="292100" dist="139700" dir="2700000" algn="tl" rotWithShape="0">
+              <a:srgbClr val="333333">
+                <a:alpha val="65000"/>
+              </a:srgbClr>
+            </a:outerShdw>
+          </a:effectLst>
+        </p:spPr>
       </p:pic>
       <p:sp>
         <p:nvSpPr>
@@ -7005,7 +7047,21 @@
             <a:fillRect/>
           </a:stretch>
         </p:blipFill>
-        <p:spPr/>
+        <p:spPr>
+          <a:prstGeom prst="rect">
+            <a:avLst/>
+          </a:prstGeom>
+          <a:ln>
+            <a:noFill/>
+          </a:ln>
+          <a:effectLst>
+            <a:outerShdw blurRad="292100" dist="139700" dir="2700000" algn="tl" rotWithShape="0">
+              <a:srgbClr val="333333">
+                <a:alpha val="65000"/>
+              </a:srgbClr>
+            </a:outerShdw>
+          </a:effectLst>
+        </p:spPr>
       </p:pic>
       <p:sp>
         <p:nvSpPr>
@@ -7226,7 +7282,21 @@
             <a:fillRect/>
           </a:stretch>
         </p:blipFill>
-        <p:spPr/>
+        <p:spPr>
+          <a:prstGeom prst="rect">
+            <a:avLst/>
+          </a:prstGeom>
+          <a:ln>
+            <a:noFill/>
+          </a:ln>
+          <a:effectLst>
+            <a:outerShdw blurRad="292100" dist="139700" dir="2700000" algn="tl" rotWithShape="0">
+              <a:srgbClr val="333333">
+                <a:alpha val="65000"/>
+              </a:srgbClr>
+            </a:outerShdw>
+          </a:effectLst>
+        </p:spPr>
       </p:pic>
       <p:sp>
         <p:nvSpPr>
@@ -7354,7 +7424,21 @@
             <a:fillRect/>
           </a:stretch>
         </p:blipFill>
-        <p:spPr/>
+        <p:spPr>
+          <a:prstGeom prst="rect">
+            <a:avLst/>
+          </a:prstGeom>
+          <a:ln>
+            <a:noFill/>
+          </a:ln>
+          <a:effectLst>
+            <a:outerShdw blurRad="292100" dist="139700" dir="2700000" algn="tl" rotWithShape="0">
+              <a:srgbClr val="333333">
+                <a:alpha val="65000"/>
+              </a:srgbClr>
+            </a:outerShdw>
+          </a:effectLst>
+        </p:spPr>
       </p:pic>
     </p:spTree>
     <p:extLst>
@@ -7432,7 +7516,21 @@
             <a:fillRect/>
           </a:stretch>
         </p:blipFill>
-        <p:spPr/>
+        <p:spPr>
+          <a:prstGeom prst="rect">
+            <a:avLst/>
+          </a:prstGeom>
+          <a:ln>
+            <a:noFill/>
+          </a:ln>
+          <a:effectLst>
+            <a:outerShdw blurRad="292100" dist="139700" dir="2700000" algn="tl" rotWithShape="0">
+              <a:srgbClr val="333333">
+                <a:alpha val="65000"/>
+              </a:srgbClr>
+            </a:outerShdw>
+          </a:effectLst>
+        </p:spPr>
       </p:pic>
     </p:spTree>
     <p:extLst>
@@ -7948,7 +8046,21 @@
             <a:fillRect/>
           </a:stretch>
         </p:blipFill>
-        <p:spPr/>
+        <p:spPr>
+          <a:prstGeom prst="rect">
+            <a:avLst/>
+          </a:prstGeom>
+          <a:ln>
+            <a:noFill/>
+          </a:ln>
+          <a:effectLst>
+            <a:outerShdw blurRad="292100" dist="139700" dir="2700000" algn="tl" rotWithShape="0">
+              <a:srgbClr val="333333">
+                <a:alpha val="65000"/>
+              </a:srgbClr>
+            </a:outerShdw>
+          </a:effectLst>
+        </p:spPr>
       </p:pic>
     </p:spTree>
     <p:extLst>

</xml_diff>

<commit_message>
Powerpoint had core functionality bits
</commit_message>
<xml_diff>
--- a/project_presentation.pptx
+++ b/project_presentation.pptx
@@ -5,26 +5,40 @@
     <p:sldMasterId id="2147483949" r:id="rId1"/>
   </p:sldMasterIdLst>
   <p:notesMasterIdLst>
-    <p:notesMasterId r:id="rId19"/>
+    <p:notesMasterId r:id="rId33"/>
   </p:notesMasterIdLst>
   <p:sldIdLst>
     <p:sldId id="256" r:id="rId2"/>
     <p:sldId id="257" r:id="rId3"/>
     <p:sldId id="258" r:id="rId4"/>
-    <p:sldId id="259" r:id="rId5"/>
-    <p:sldId id="261" r:id="rId6"/>
-    <p:sldId id="263" r:id="rId7"/>
-    <p:sldId id="264" r:id="rId8"/>
-    <p:sldId id="265" r:id="rId9"/>
-    <p:sldId id="266" r:id="rId10"/>
-    <p:sldId id="267" r:id="rId11"/>
-    <p:sldId id="268" r:id="rId12"/>
-    <p:sldId id="269" r:id="rId13"/>
-    <p:sldId id="262" r:id="rId14"/>
-    <p:sldId id="270" r:id="rId15"/>
-    <p:sldId id="260" r:id="rId16"/>
-    <p:sldId id="272" r:id="rId17"/>
-    <p:sldId id="271" r:id="rId18"/>
+    <p:sldId id="273" r:id="rId5"/>
+    <p:sldId id="274" r:id="rId6"/>
+    <p:sldId id="275" r:id="rId7"/>
+    <p:sldId id="276" r:id="rId8"/>
+    <p:sldId id="277" r:id="rId9"/>
+    <p:sldId id="278" r:id="rId10"/>
+    <p:sldId id="279" r:id="rId11"/>
+    <p:sldId id="280" r:id="rId12"/>
+    <p:sldId id="281" r:id="rId13"/>
+    <p:sldId id="282" r:id="rId14"/>
+    <p:sldId id="283" r:id="rId15"/>
+    <p:sldId id="284" r:id="rId16"/>
+    <p:sldId id="286" r:id="rId17"/>
+    <p:sldId id="285" r:id="rId18"/>
+    <p:sldId id="259" r:id="rId19"/>
+    <p:sldId id="261" r:id="rId20"/>
+    <p:sldId id="263" r:id="rId21"/>
+    <p:sldId id="264" r:id="rId22"/>
+    <p:sldId id="265" r:id="rId23"/>
+    <p:sldId id="266" r:id="rId24"/>
+    <p:sldId id="267" r:id="rId25"/>
+    <p:sldId id="268" r:id="rId26"/>
+    <p:sldId id="269" r:id="rId27"/>
+    <p:sldId id="262" r:id="rId28"/>
+    <p:sldId id="270" r:id="rId29"/>
+    <p:sldId id="260" r:id="rId30"/>
+    <p:sldId id="272" r:id="rId31"/>
+    <p:sldId id="271" r:id="rId32"/>
   </p:sldIdLst>
   <p:sldSz cx="9144000" cy="6858000" type="screen4x3"/>
   <p:notesSz cx="6858000" cy="9144000"/>
@@ -208,7 +222,7 @@
           <a:p>
             <a:fld id="{0F9B2F1A-287B-1549-B871-2516245E23A3}" type="datetimeFigureOut">
               <a:rPr lang="en-US" smtClean="0"/>
-              <a:t>4/27/15</a:t>
+              <a:t>4/29/2015</a:t>
             </a:fld>
             <a:endParaRPr lang="en-US"/>
           </a:p>
@@ -629,7 +643,7 @@
           <a:p>
             <a:fld id="{2E91EB33-377D-8042-A9F7-722A70D3403B}" type="slidenum">
               <a:rPr lang="en-US" smtClean="0"/>
-              <a:t>14</a:t>
+              <a:t>28</a:t>
             </a:fld>
             <a:endParaRPr lang="en-US"/>
           </a:p>
@@ -717,7 +731,7 @@
           <a:p>
             <a:fld id="{2E91EB33-377D-8042-A9F7-722A70D3403B}" type="slidenum">
               <a:rPr lang="en-US" smtClean="0"/>
-              <a:t>17</a:t>
+              <a:t>31</a:t>
             </a:fld>
             <a:endParaRPr lang="en-US"/>
           </a:p>
@@ -805,7 +819,7 @@
           <a:p>
             <a:fld id="{2E91EB33-377D-8042-A9F7-722A70D3403B}" type="slidenum">
               <a:rPr lang="en-US" smtClean="0"/>
-              <a:t>5</a:t>
+              <a:t>19</a:t>
             </a:fld>
             <a:endParaRPr lang="en-US"/>
           </a:p>
@@ -893,7 +907,7 @@
           <a:p>
             <a:fld id="{2E91EB33-377D-8042-A9F7-722A70D3403B}" type="slidenum">
               <a:rPr lang="en-US" smtClean="0"/>
-              <a:t>6</a:t>
+              <a:t>20</a:t>
             </a:fld>
             <a:endParaRPr lang="en-US"/>
           </a:p>
@@ -981,7 +995,7 @@
           <a:p>
             <a:fld id="{2E91EB33-377D-8042-A9F7-722A70D3403B}" type="slidenum">
               <a:rPr lang="en-US" smtClean="0"/>
-              <a:t>8</a:t>
+              <a:t>22</a:t>
             </a:fld>
             <a:endParaRPr lang="en-US"/>
           </a:p>
@@ -1069,7 +1083,7 @@
           <a:p>
             <a:fld id="{2E91EB33-377D-8042-A9F7-722A70D3403B}" type="slidenum">
               <a:rPr lang="en-US" smtClean="0"/>
-              <a:t>9</a:t>
+              <a:t>23</a:t>
             </a:fld>
             <a:endParaRPr lang="en-US"/>
           </a:p>
@@ -1157,7 +1171,7 @@
           <a:p>
             <a:fld id="{2E91EB33-377D-8042-A9F7-722A70D3403B}" type="slidenum">
               <a:rPr lang="en-US" smtClean="0"/>
-              <a:t>10</a:t>
+              <a:t>24</a:t>
             </a:fld>
             <a:endParaRPr lang="en-US"/>
           </a:p>
@@ -1245,7 +1259,7 @@
           <a:p>
             <a:fld id="{2E91EB33-377D-8042-A9F7-722A70D3403B}" type="slidenum">
               <a:rPr lang="en-US" smtClean="0"/>
-              <a:t>11</a:t>
+              <a:t>25</a:t>
             </a:fld>
             <a:endParaRPr lang="en-US"/>
           </a:p>
@@ -1333,7 +1347,7 @@
           <a:p>
             <a:fld id="{2E91EB33-377D-8042-A9F7-722A70D3403B}" type="slidenum">
               <a:rPr lang="en-US" smtClean="0"/>
-              <a:t>12</a:t>
+              <a:t>26</a:t>
             </a:fld>
             <a:endParaRPr lang="en-US"/>
           </a:p>
@@ -1421,7 +1435,7 @@
           <a:p>
             <a:fld id="{2E91EB33-377D-8042-A9F7-722A70D3403B}" type="slidenum">
               <a:rPr lang="en-US" smtClean="0"/>
-              <a:t>13</a:t>
+              <a:t>27</a:t>
             </a:fld>
             <a:endParaRPr lang="en-US"/>
           </a:p>
@@ -1628,7 +1642,7 @@
           <a:p>
             <a:fld id="{67498D32-CF37-1848-A958-A191270B3DA1}" type="datetimeFigureOut">
               <a:rPr lang="en-US" smtClean="0"/>
-              <a:t>4/27/15</a:t>
+              <a:t>4/29/2015</a:t>
             </a:fld>
             <a:endParaRPr lang="en-US"/>
           </a:p>
@@ -1829,7 +1843,7 @@
           <a:p>
             <a:fld id="{67498D32-CF37-1848-A958-A191270B3DA1}" type="datetimeFigureOut">
               <a:rPr lang="en-US" smtClean="0"/>
-              <a:t>4/27/15</a:t>
+              <a:t>4/29/2015</a:t>
             </a:fld>
             <a:endParaRPr lang="en-US"/>
           </a:p>
@@ -2004,7 +2018,7 @@
           <a:p>
             <a:fld id="{67498D32-CF37-1848-A958-A191270B3DA1}" type="datetimeFigureOut">
               <a:rPr lang="en-US" smtClean="0"/>
-              <a:t>4/27/15</a:t>
+              <a:t>4/29/2015</a:t>
             </a:fld>
             <a:endParaRPr lang="en-US"/>
           </a:p>
@@ -2169,7 +2183,7 @@
           <a:p>
             <a:fld id="{67498D32-CF37-1848-A958-A191270B3DA1}" type="datetimeFigureOut">
               <a:rPr lang="en-US" smtClean="0"/>
-              <a:t>4/27/15</a:t>
+              <a:t>4/29/2015</a:t>
             </a:fld>
             <a:endParaRPr lang="en-US"/>
           </a:p>
@@ -2417,7 +2431,7 @@
           <a:p>
             <a:fld id="{67498D32-CF37-1848-A958-A191270B3DA1}" type="datetimeFigureOut">
               <a:rPr lang="en-US" smtClean="0"/>
-              <a:t>4/27/15</a:t>
+              <a:t>4/29/2015</a:t>
             </a:fld>
             <a:endParaRPr lang="en-US"/>
           </a:p>
@@ -2735,7 +2749,7 @@
           <a:p>
             <a:fld id="{67498D32-CF37-1848-A958-A191270B3DA1}" type="datetimeFigureOut">
               <a:rPr lang="en-US" smtClean="0"/>
-              <a:t>4/27/15</a:t>
+              <a:t>4/29/2015</a:t>
             </a:fld>
             <a:endParaRPr lang="en-US"/>
           </a:p>
@@ -3201,7 +3215,7 @@
           <a:p>
             <a:fld id="{67498D32-CF37-1848-A958-A191270B3DA1}" type="datetimeFigureOut">
               <a:rPr lang="en-US" smtClean="0"/>
-              <a:t>4/27/15</a:t>
+              <a:t>4/29/2015</a:t>
             </a:fld>
             <a:endParaRPr lang="en-US"/>
           </a:p>
@@ -3349,7 +3363,7 @@
           <a:p>
             <a:fld id="{67498D32-CF37-1848-A958-A191270B3DA1}" type="datetimeFigureOut">
               <a:rPr lang="en-US" smtClean="0"/>
-              <a:t>4/27/15</a:t>
+              <a:t>4/29/2015</a:t>
             </a:fld>
             <a:endParaRPr lang="en-US"/>
           </a:p>
@@ -3439,7 +3453,7 @@
           <a:p>
             <a:fld id="{67498D32-CF37-1848-A958-A191270B3DA1}" type="datetimeFigureOut">
               <a:rPr lang="en-US" smtClean="0"/>
-              <a:t>4/27/15</a:t>
+              <a:t>4/29/2015</a:t>
             </a:fld>
             <a:endParaRPr lang="en-US"/>
           </a:p>
@@ -3713,7 +3727,7 @@
           <a:p>
             <a:fld id="{67498D32-CF37-1848-A958-A191270B3DA1}" type="datetimeFigureOut">
               <a:rPr lang="en-US" smtClean="0"/>
-              <a:t>4/27/15</a:t>
+              <a:t>4/29/2015</a:t>
             </a:fld>
             <a:endParaRPr lang="en-US"/>
           </a:p>
@@ -4019,7 +4033,7 @@
           <a:p>
             <a:fld id="{67498D32-CF37-1848-A958-A191270B3DA1}" type="datetimeFigureOut">
               <a:rPr lang="en-US" smtClean="0"/>
-              <a:t>4/27/15</a:t>
+              <a:t>4/29/2015</a:t>
             </a:fld>
             <a:endParaRPr lang="en-US"/>
           </a:p>
@@ -4317,7 +4331,7 @@
           <a:p>
             <a:fld id="{67498D32-CF37-1848-A958-A191270B3DA1}" type="datetimeFigureOut">
               <a:rPr lang="en-US" smtClean="0"/>
-              <a:t>4/27/15</a:t>
+              <a:t>4/29/2015</a:t>
             </a:fld>
             <a:endParaRPr lang="en-US"/>
           </a:p>
@@ -4815,6 +4829,2049 @@
           <a:p>
             <a:r>
               <a:rPr lang="en-US" dirty="0" smtClean="0"/>
+              <a:t>List Membership</a:t>
+            </a:r>
+            <a:endParaRPr lang="en-US" dirty="0"/>
+          </a:p>
+        </p:txBody>
+      </p:sp>
+      <p:sp>
+        <p:nvSpPr>
+          <p:cNvPr id="3" name="Content Placeholder 2"/>
+          <p:cNvSpPr>
+            <a:spLocks noGrp="1"/>
+          </p:cNvSpPr>
+          <p:nvPr>
+            <p:ph idx="1"/>
+          </p:nvPr>
+        </p:nvSpPr>
+        <p:spPr/>
+        <p:txBody>
+          <a:bodyPr/>
+          <a:lstStyle/>
+          <a:p>
+            <a:r>
+              <a:rPr lang="en-US" dirty="0" smtClean="0"/>
+              <a:t>See current membership, add/remove functionality</a:t>
+            </a:r>
+          </a:p>
+          <a:p>
+            <a:r>
+              <a:rPr lang="en-US" dirty="0" smtClean="0"/>
+              <a:t>See active employees not in list (add &gt;1 at a time)</a:t>
+            </a:r>
+          </a:p>
+          <a:p>
+            <a:r>
+              <a:rPr lang="en-US" dirty="0" smtClean="0"/>
+              <a:t>Warn of inactive members with easy removal</a:t>
+            </a:r>
+          </a:p>
+          <a:p>
+            <a:r>
+              <a:rPr lang="en-US" dirty="0" smtClean="0"/>
+              <a:t>See list of active employees</a:t>
+            </a:r>
+          </a:p>
+          <a:p>
+            <a:pPr lvl="1"/>
+            <a:r>
+              <a:rPr lang="en-US" dirty="0" smtClean="0"/>
+              <a:t>Searches</a:t>
+            </a:r>
+          </a:p>
+        </p:txBody>
+      </p:sp>
+    </p:spTree>
+    <p:extLst>
+      <p:ext uri="{BB962C8B-B14F-4D97-AF65-F5344CB8AC3E}">
+        <p14:creationId xmlns:p14="http://schemas.microsoft.com/office/powerpoint/2010/main" val="2134995126"/>
+      </p:ext>
+    </p:extLst>
+  </p:cSld>
+  <p:clrMapOvr>
+    <a:masterClrMapping/>
+  </p:clrMapOvr>
+</p:sld>
+</file>
+
+<file path=ppt/slides/slide11.xml><?xml version="1.0" encoding="utf-8"?>
+<p:sld xmlns:a="http://schemas.openxmlformats.org/drawingml/2006/main" xmlns:r="http://schemas.openxmlformats.org/officeDocument/2006/relationships" xmlns:p="http://schemas.openxmlformats.org/presentationml/2006/main">
+  <p:cSld>
+    <p:spTree>
+      <p:nvGrpSpPr>
+        <p:cNvPr id="1" name=""/>
+        <p:cNvGrpSpPr/>
+        <p:nvPr/>
+      </p:nvGrpSpPr>
+      <p:grpSpPr>
+        <a:xfrm>
+          <a:off x="0" y="0"/>
+          <a:ext cx="0" cy="0"/>
+          <a:chOff x="0" y="0"/>
+          <a:chExt cx="0" cy="0"/>
+        </a:xfrm>
+      </p:grpSpPr>
+      <p:sp>
+        <p:nvSpPr>
+          <p:cNvPr id="2" name="Title 1"/>
+          <p:cNvSpPr>
+            <a:spLocks noGrp="1"/>
+          </p:cNvSpPr>
+          <p:nvPr>
+            <p:ph type="title"/>
+          </p:nvPr>
+        </p:nvSpPr>
+        <p:spPr/>
+        <p:txBody>
+          <a:bodyPr/>
+          <a:lstStyle/>
+          <a:p>
+            <a:r>
+              <a:rPr lang="en-US" dirty="0" smtClean="0"/>
+              <a:t>See List Membership</a:t>
+            </a:r>
+            <a:endParaRPr lang="en-US" dirty="0"/>
+          </a:p>
+        </p:txBody>
+      </p:sp>
+      <p:pic>
+        <p:nvPicPr>
+          <p:cNvPr id="4098" name="Picture 2"/>
+          <p:cNvPicPr>
+            <a:picLocks noChangeAspect="1" noChangeArrowheads="1"/>
+          </p:cNvPicPr>
+          <p:nvPr/>
+        </p:nvPicPr>
+        <p:blipFill>
+          <a:blip r:embed="rId2">
+            <a:extLst>
+              <a:ext uri="{28A0092B-C50C-407E-A947-70E740481C1C}">
+                <a14:useLocalDpi xmlns:a14="http://schemas.microsoft.com/office/drawing/2010/main" val="0"/>
+              </a:ext>
+            </a:extLst>
+          </a:blip>
+          <a:srcRect/>
+          <a:stretch>
+            <a:fillRect/>
+          </a:stretch>
+        </p:blipFill>
+        <p:spPr bwMode="auto">
+          <a:xfrm>
+            <a:off x="64395" y="1524000"/>
+            <a:ext cx="7816669" cy="3490176"/>
+          </a:xfrm>
+          <a:prstGeom prst="rect">
+            <a:avLst/>
+          </a:prstGeom>
+          <a:noFill/>
+          <a:ln>
+            <a:noFill/>
+          </a:ln>
+          <a:extLst>
+            <a:ext uri="{909E8E84-426E-40DD-AFC4-6F175D3DCCD1}">
+              <a14:hiddenFill xmlns:a14="http://schemas.microsoft.com/office/drawing/2010/main">
+                <a:solidFill>
+                  <a:schemeClr val="accent1"/>
+                </a:solidFill>
+              </a14:hiddenFill>
+            </a:ext>
+            <a:ext uri="{91240B29-F687-4F45-9708-019B960494DF}">
+              <a14:hiddenLine xmlns:a14="http://schemas.microsoft.com/office/drawing/2010/main" w="9525">
+                <a:solidFill>
+                  <a:schemeClr val="tx1"/>
+                </a:solidFill>
+                <a:miter lim="800000"/>
+                <a:headEnd/>
+                <a:tailEnd/>
+              </a14:hiddenLine>
+            </a:ext>
+          </a:extLst>
+        </p:spPr>
+      </p:pic>
+      <p:pic>
+        <p:nvPicPr>
+          <p:cNvPr id="4099" name="Picture 3"/>
+          <p:cNvPicPr>
+            <a:picLocks noChangeAspect="1" noChangeArrowheads="1"/>
+          </p:cNvPicPr>
+          <p:nvPr/>
+        </p:nvPicPr>
+        <p:blipFill>
+          <a:blip r:embed="rId3">
+            <a:extLst>
+              <a:ext uri="{28A0092B-C50C-407E-A947-70E740481C1C}">
+                <a14:useLocalDpi xmlns:a14="http://schemas.microsoft.com/office/drawing/2010/main" val="0"/>
+              </a:ext>
+            </a:extLst>
+          </a:blip>
+          <a:srcRect/>
+          <a:stretch>
+            <a:fillRect/>
+          </a:stretch>
+        </p:blipFill>
+        <p:spPr bwMode="auto">
+          <a:xfrm>
+            <a:off x="994064" y="5063887"/>
+            <a:ext cx="5957329" cy="1794113"/>
+          </a:xfrm>
+          <a:prstGeom prst="rect">
+            <a:avLst/>
+          </a:prstGeom>
+          <a:noFill/>
+          <a:ln>
+            <a:noFill/>
+          </a:ln>
+          <a:extLst>
+            <a:ext uri="{909E8E84-426E-40DD-AFC4-6F175D3DCCD1}">
+              <a14:hiddenFill xmlns:a14="http://schemas.microsoft.com/office/drawing/2010/main">
+                <a:solidFill>
+                  <a:schemeClr val="accent1"/>
+                </a:solidFill>
+              </a14:hiddenFill>
+            </a:ext>
+            <a:ext uri="{91240B29-F687-4F45-9708-019B960494DF}">
+              <a14:hiddenLine xmlns:a14="http://schemas.microsoft.com/office/drawing/2010/main" w="9525">
+                <a:solidFill>
+                  <a:schemeClr val="tx1"/>
+                </a:solidFill>
+                <a:miter lim="800000"/>
+                <a:headEnd/>
+                <a:tailEnd/>
+              </a14:hiddenLine>
+            </a:ext>
+          </a:extLst>
+        </p:spPr>
+      </p:pic>
+      <p:sp>
+        <p:nvSpPr>
+          <p:cNvPr id="4" name="TextBox 3"/>
+          <p:cNvSpPr txBox="1"/>
+          <p:nvPr/>
+        </p:nvSpPr>
+        <p:spPr>
+          <a:xfrm>
+            <a:off x="5190186" y="581524"/>
+            <a:ext cx="3721994" cy="923330"/>
+          </a:xfrm>
+          <a:prstGeom prst="rect">
+            <a:avLst/>
+          </a:prstGeom>
+          <a:noFill/>
+        </p:spPr>
+        <p:txBody>
+          <a:bodyPr wrap="square" rtlCol="0">
+            <a:spAutoFit/>
+          </a:bodyPr>
+          <a:lstStyle/>
+          <a:p>
+            <a:r>
+              <a:rPr lang="en-US" dirty="0" smtClean="0"/>
+              <a:t>Inactive employees</a:t>
+            </a:r>
+          </a:p>
+          <a:p>
+            <a:r>
+              <a:rPr lang="en-US" dirty="0" smtClean="0"/>
+              <a:t>Delete Employees from list</a:t>
+            </a:r>
+          </a:p>
+          <a:p>
+            <a:r>
+              <a:rPr lang="en-US" dirty="0" smtClean="0"/>
+              <a:t>Add Members</a:t>
+            </a:r>
+            <a:endParaRPr lang="en-US" dirty="0"/>
+          </a:p>
+        </p:txBody>
+      </p:sp>
+    </p:spTree>
+    <p:extLst>
+      <p:ext uri="{BB962C8B-B14F-4D97-AF65-F5344CB8AC3E}">
+        <p14:creationId xmlns:p14="http://schemas.microsoft.com/office/powerpoint/2010/main" val="1517153184"/>
+      </p:ext>
+    </p:extLst>
+  </p:cSld>
+  <p:clrMapOvr>
+    <a:masterClrMapping/>
+  </p:clrMapOvr>
+</p:sld>
+</file>
+
+<file path=ppt/slides/slide12.xml><?xml version="1.0" encoding="utf-8"?>
+<p:sld xmlns:a="http://schemas.openxmlformats.org/drawingml/2006/main" xmlns:r="http://schemas.openxmlformats.org/officeDocument/2006/relationships" xmlns:p="http://schemas.openxmlformats.org/presentationml/2006/main">
+  <p:cSld>
+    <p:spTree>
+      <p:nvGrpSpPr>
+        <p:cNvPr id="1" name=""/>
+        <p:cNvGrpSpPr/>
+        <p:nvPr/>
+      </p:nvGrpSpPr>
+      <p:grpSpPr>
+        <a:xfrm>
+          <a:off x="0" y="0"/>
+          <a:ext cx="0" cy="0"/>
+          <a:chOff x="0" y="0"/>
+          <a:chExt cx="0" cy="0"/>
+        </a:xfrm>
+      </p:grpSpPr>
+      <p:sp>
+        <p:nvSpPr>
+          <p:cNvPr id="2" name="Title 1"/>
+          <p:cNvSpPr>
+            <a:spLocks noGrp="1"/>
+          </p:cNvSpPr>
+          <p:nvPr>
+            <p:ph type="title"/>
+          </p:nvPr>
+        </p:nvSpPr>
+        <p:spPr/>
+        <p:txBody>
+          <a:bodyPr/>
+          <a:lstStyle/>
+          <a:p>
+            <a:r>
+              <a:rPr lang="en-US" dirty="0" smtClean="0"/>
+              <a:t>Add Members</a:t>
+            </a:r>
+            <a:endParaRPr lang="en-US" dirty="0"/>
+          </a:p>
+        </p:txBody>
+      </p:sp>
+      <p:pic>
+        <p:nvPicPr>
+          <p:cNvPr id="5123" name="Picture 3"/>
+          <p:cNvPicPr>
+            <a:picLocks noChangeAspect="1" noChangeArrowheads="1"/>
+          </p:cNvPicPr>
+          <p:nvPr/>
+        </p:nvPicPr>
+        <p:blipFill>
+          <a:blip r:embed="rId2">
+            <a:extLst>
+              <a:ext uri="{28A0092B-C50C-407E-A947-70E740481C1C}">
+                <a14:useLocalDpi xmlns:a14="http://schemas.microsoft.com/office/drawing/2010/main" val="0"/>
+              </a:ext>
+            </a:extLst>
+          </a:blip>
+          <a:srcRect/>
+          <a:stretch>
+            <a:fillRect/>
+          </a:stretch>
+        </p:blipFill>
+        <p:spPr bwMode="auto">
+          <a:xfrm>
+            <a:off x="1393356" y="1777465"/>
+            <a:ext cx="6176985" cy="2213960"/>
+          </a:xfrm>
+          <a:prstGeom prst="rect">
+            <a:avLst/>
+          </a:prstGeom>
+          <a:noFill/>
+          <a:ln>
+            <a:noFill/>
+          </a:ln>
+          <a:extLst>
+            <a:ext uri="{909E8E84-426E-40DD-AFC4-6F175D3DCCD1}">
+              <a14:hiddenFill xmlns:a14="http://schemas.microsoft.com/office/drawing/2010/main">
+                <a:solidFill>
+                  <a:schemeClr val="accent1"/>
+                </a:solidFill>
+              </a14:hiddenFill>
+            </a:ext>
+            <a:ext uri="{91240B29-F687-4F45-9708-019B960494DF}">
+              <a14:hiddenLine xmlns:a14="http://schemas.microsoft.com/office/drawing/2010/main" w="9525">
+                <a:solidFill>
+                  <a:schemeClr val="tx1"/>
+                </a:solidFill>
+                <a:miter lim="800000"/>
+                <a:headEnd/>
+                <a:tailEnd/>
+              </a14:hiddenLine>
+            </a:ext>
+          </a:extLst>
+        </p:spPr>
+      </p:pic>
+      <p:pic>
+        <p:nvPicPr>
+          <p:cNvPr id="5124" name="Picture 4"/>
+          <p:cNvPicPr>
+            <a:picLocks noChangeAspect="1" noChangeArrowheads="1"/>
+          </p:cNvPicPr>
+          <p:nvPr/>
+        </p:nvPicPr>
+        <p:blipFill>
+          <a:blip r:embed="rId3">
+            <a:extLst>
+              <a:ext uri="{28A0092B-C50C-407E-A947-70E740481C1C}">
+                <a14:useLocalDpi xmlns:a14="http://schemas.microsoft.com/office/drawing/2010/main" val="0"/>
+              </a:ext>
+            </a:extLst>
+          </a:blip>
+          <a:srcRect/>
+          <a:stretch>
+            <a:fillRect/>
+          </a:stretch>
+        </p:blipFill>
+        <p:spPr bwMode="auto">
+          <a:xfrm>
+            <a:off x="1365162" y="4269457"/>
+            <a:ext cx="6233374" cy="2248481"/>
+          </a:xfrm>
+          <a:prstGeom prst="rect">
+            <a:avLst/>
+          </a:prstGeom>
+          <a:noFill/>
+          <a:ln>
+            <a:noFill/>
+          </a:ln>
+          <a:extLst>
+            <a:ext uri="{909E8E84-426E-40DD-AFC4-6F175D3DCCD1}">
+              <a14:hiddenFill xmlns:a14="http://schemas.microsoft.com/office/drawing/2010/main">
+                <a:solidFill>
+                  <a:schemeClr val="accent1"/>
+                </a:solidFill>
+              </a14:hiddenFill>
+            </a:ext>
+            <a:ext uri="{91240B29-F687-4F45-9708-019B960494DF}">
+              <a14:hiddenLine xmlns:a14="http://schemas.microsoft.com/office/drawing/2010/main" w="9525">
+                <a:solidFill>
+                  <a:schemeClr val="tx1"/>
+                </a:solidFill>
+                <a:miter lim="800000"/>
+                <a:headEnd/>
+                <a:tailEnd/>
+              </a14:hiddenLine>
+            </a:ext>
+          </a:extLst>
+        </p:spPr>
+      </p:pic>
+      <p:sp>
+        <p:nvSpPr>
+          <p:cNvPr id="4" name="TextBox 3"/>
+          <p:cNvSpPr txBox="1"/>
+          <p:nvPr/>
+        </p:nvSpPr>
+        <p:spPr>
+          <a:xfrm>
+            <a:off x="798490" y="1275009"/>
+            <a:ext cx="7888310" cy="369332"/>
+          </a:xfrm>
+          <a:prstGeom prst="rect">
+            <a:avLst/>
+          </a:prstGeom>
+          <a:noFill/>
+        </p:spPr>
+        <p:txBody>
+          <a:bodyPr wrap="square" rtlCol="0">
+            <a:spAutoFit/>
+          </a:bodyPr>
+          <a:lstStyle/>
+          <a:p>
+            <a:r>
+              <a:rPr lang="en-US" dirty="0" smtClean="0"/>
+              <a:t>See all active employees not on list</a:t>
+            </a:r>
+            <a:endParaRPr lang="en-US" dirty="0"/>
+          </a:p>
+        </p:txBody>
+      </p:sp>
+    </p:spTree>
+    <p:extLst>
+      <p:ext uri="{BB962C8B-B14F-4D97-AF65-F5344CB8AC3E}">
+        <p14:creationId xmlns:p14="http://schemas.microsoft.com/office/powerpoint/2010/main" val="859694321"/>
+      </p:ext>
+    </p:extLst>
+  </p:cSld>
+  <p:clrMapOvr>
+    <a:masterClrMapping/>
+  </p:clrMapOvr>
+</p:sld>
+</file>
+
+<file path=ppt/slides/slide13.xml><?xml version="1.0" encoding="utf-8"?>
+<p:sld xmlns:a="http://schemas.openxmlformats.org/drawingml/2006/main" xmlns:r="http://schemas.openxmlformats.org/officeDocument/2006/relationships" xmlns:p="http://schemas.openxmlformats.org/presentationml/2006/main">
+  <p:cSld>
+    <p:spTree>
+      <p:nvGrpSpPr>
+        <p:cNvPr id="1" name=""/>
+        <p:cNvGrpSpPr/>
+        <p:nvPr/>
+      </p:nvGrpSpPr>
+      <p:grpSpPr>
+        <a:xfrm>
+          <a:off x="0" y="0"/>
+          <a:ext cx="0" cy="0"/>
+          <a:chOff x="0" y="0"/>
+          <a:chExt cx="0" cy="0"/>
+        </a:xfrm>
+      </p:grpSpPr>
+      <p:sp>
+        <p:nvSpPr>
+          <p:cNvPr id="2" name="Title 1"/>
+          <p:cNvSpPr>
+            <a:spLocks noGrp="1"/>
+          </p:cNvSpPr>
+          <p:nvPr>
+            <p:ph type="title"/>
+          </p:nvPr>
+        </p:nvSpPr>
+        <p:spPr/>
+        <p:txBody>
+          <a:bodyPr/>
+          <a:lstStyle/>
+          <a:p>
+            <a:r>
+              <a:rPr lang="en-US" dirty="0" smtClean="0"/>
+              <a:t>See All Active Employees</a:t>
+            </a:r>
+            <a:endParaRPr lang="en-US" dirty="0"/>
+          </a:p>
+        </p:txBody>
+      </p:sp>
+      <p:pic>
+        <p:nvPicPr>
+          <p:cNvPr id="6146" name="Picture 2"/>
+          <p:cNvPicPr>
+            <a:picLocks noChangeAspect="1" noChangeArrowheads="1"/>
+          </p:cNvPicPr>
+          <p:nvPr/>
+        </p:nvPicPr>
+        <p:blipFill>
+          <a:blip r:embed="rId2">
+            <a:extLst>
+              <a:ext uri="{28A0092B-C50C-407E-A947-70E740481C1C}">
+                <a14:useLocalDpi xmlns:a14="http://schemas.microsoft.com/office/drawing/2010/main" val="0"/>
+              </a:ext>
+            </a:extLst>
+          </a:blip>
+          <a:srcRect/>
+          <a:stretch>
+            <a:fillRect/>
+          </a:stretch>
+        </p:blipFill>
+        <p:spPr bwMode="auto">
+          <a:xfrm>
+            <a:off x="231819" y="1437223"/>
+            <a:ext cx="8569088" cy="2582527"/>
+          </a:xfrm>
+          <a:prstGeom prst="rect">
+            <a:avLst/>
+          </a:prstGeom>
+          <a:noFill/>
+          <a:ln>
+            <a:noFill/>
+          </a:ln>
+          <a:extLst>
+            <a:ext uri="{909E8E84-426E-40DD-AFC4-6F175D3DCCD1}">
+              <a14:hiddenFill xmlns:a14="http://schemas.microsoft.com/office/drawing/2010/main">
+                <a:solidFill>
+                  <a:schemeClr val="accent1"/>
+                </a:solidFill>
+              </a14:hiddenFill>
+            </a:ext>
+            <a:ext uri="{91240B29-F687-4F45-9708-019B960494DF}">
+              <a14:hiddenLine xmlns:a14="http://schemas.microsoft.com/office/drawing/2010/main" w="9525">
+                <a:solidFill>
+                  <a:schemeClr val="tx1"/>
+                </a:solidFill>
+                <a:miter lim="800000"/>
+                <a:headEnd/>
+                <a:tailEnd/>
+              </a14:hiddenLine>
+            </a:ext>
+          </a:extLst>
+        </p:spPr>
+      </p:pic>
+      <p:pic>
+        <p:nvPicPr>
+          <p:cNvPr id="6147" name="Picture 3"/>
+          <p:cNvPicPr>
+            <a:picLocks noChangeAspect="1" noChangeArrowheads="1"/>
+          </p:cNvPicPr>
+          <p:nvPr/>
+        </p:nvPicPr>
+        <p:blipFill>
+          <a:blip r:embed="rId3">
+            <a:extLst>
+              <a:ext uri="{28A0092B-C50C-407E-A947-70E740481C1C}">
+                <a14:useLocalDpi xmlns:a14="http://schemas.microsoft.com/office/drawing/2010/main" val="0"/>
+              </a:ext>
+            </a:extLst>
+          </a:blip>
+          <a:srcRect/>
+          <a:stretch>
+            <a:fillRect/>
+          </a:stretch>
+        </p:blipFill>
+        <p:spPr bwMode="auto">
+          <a:xfrm>
+            <a:off x="833005" y="4280707"/>
+            <a:ext cx="7366716" cy="2325303"/>
+          </a:xfrm>
+          <a:prstGeom prst="rect">
+            <a:avLst/>
+          </a:prstGeom>
+          <a:noFill/>
+          <a:ln>
+            <a:noFill/>
+          </a:ln>
+          <a:extLst>
+            <a:ext uri="{909E8E84-426E-40DD-AFC4-6F175D3DCCD1}">
+              <a14:hiddenFill xmlns:a14="http://schemas.microsoft.com/office/drawing/2010/main">
+                <a:solidFill>
+                  <a:schemeClr val="accent1"/>
+                </a:solidFill>
+              </a14:hiddenFill>
+            </a:ext>
+            <a:ext uri="{91240B29-F687-4F45-9708-019B960494DF}">
+              <a14:hiddenLine xmlns:a14="http://schemas.microsoft.com/office/drawing/2010/main" w="9525">
+                <a:solidFill>
+                  <a:schemeClr val="tx1"/>
+                </a:solidFill>
+                <a:miter lim="800000"/>
+                <a:headEnd/>
+                <a:tailEnd/>
+              </a14:hiddenLine>
+            </a:ext>
+          </a:extLst>
+        </p:spPr>
+      </p:pic>
+    </p:spTree>
+    <p:extLst>
+      <p:ext uri="{BB962C8B-B14F-4D97-AF65-F5344CB8AC3E}">
+        <p14:creationId xmlns:p14="http://schemas.microsoft.com/office/powerpoint/2010/main" val="800994535"/>
+      </p:ext>
+    </p:extLst>
+  </p:cSld>
+  <p:clrMapOvr>
+    <a:masterClrMapping/>
+  </p:clrMapOvr>
+</p:sld>
+</file>
+
+<file path=ppt/slides/slide14.xml><?xml version="1.0" encoding="utf-8"?>
+<p:sld xmlns:a="http://schemas.openxmlformats.org/drawingml/2006/main" xmlns:r="http://schemas.openxmlformats.org/officeDocument/2006/relationships" xmlns:p="http://schemas.openxmlformats.org/presentationml/2006/main">
+  <p:cSld>
+    <p:spTree>
+      <p:nvGrpSpPr>
+        <p:cNvPr id="1" name=""/>
+        <p:cNvGrpSpPr/>
+        <p:nvPr/>
+      </p:nvGrpSpPr>
+      <p:grpSpPr>
+        <a:xfrm>
+          <a:off x="0" y="0"/>
+          <a:ext cx="0" cy="0"/>
+          <a:chOff x="0" y="0"/>
+          <a:chExt cx="0" cy="0"/>
+        </a:xfrm>
+      </p:grpSpPr>
+      <p:sp>
+        <p:nvSpPr>
+          <p:cNvPr id="2" name="Title 1"/>
+          <p:cNvSpPr>
+            <a:spLocks noGrp="1"/>
+          </p:cNvSpPr>
+          <p:nvPr>
+            <p:ph type="title"/>
+          </p:nvPr>
+        </p:nvSpPr>
+        <p:spPr/>
+        <p:txBody>
+          <a:bodyPr/>
+          <a:lstStyle/>
+          <a:p>
+            <a:r>
+              <a:rPr lang="en-US" dirty="0" smtClean="0"/>
+              <a:t>General List Maintenance</a:t>
+            </a:r>
+            <a:endParaRPr lang="en-US" dirty="0"/>
+          </a:p>
+        </p:txBody>
+      </p:sp>
+      <p:sp>
+        <p:nvSpPr>
+          <p:cNvPr id="3" name="Content Placeholder 2"/>
+          <p:cNvSpPr>
+            <a:spLocks noGrp="1"/>
+          </p:cNvSpPr>
+          <p:nvPr>
+            <p:ph idx="1"/>
+          </p:nvPr>
+        </p:nvSpPr>
+        <p:spPr/>
+        <p:txBody>
+          <a:bodyPr/>
+          <a:lstStyle/>
+          <a:p>
+            <a:r>
+              <a:rPr lang="en-US" dirty="0" smtClean="0"/>
+              <a:t>Clone Membership</a:t>
+            </a:r>
+          </a:p>
+          <a:p>
+            <a:r>
+              <a:rPr lang="en-US" dirty="0" smtClean="0"/>
+              <a:t>Remove employee from all their lists</a:t>
+            </a:r>
+          </a:p>
+          <a:p>
+            <a:r>
+              <a:rPr lang="en-US" dirty="0" smtClean="0"/>
+              <a:t>See all lists employee belongs to</a:t>
+            </a:r>
+            <a:endParaRPr lang="en-US" dirty="0"/>
+          </a:p>
+        </p:txBody>
+      </p:sp>
+    </p:spTree>
+    <p:extLst>
+      <p:ext uri="{BB962C8B-B14F-4D97-AF65-F5344CB8AC3E}">
+        <p14:creationId xmlns:p14="http://schemas.microsoft.com/office/powerpoint/2010/main" val="437782939"/>
+      </p:ext>
+    </p:extLst>
+  </p:cSld>
+  <p:clrMapOvr>
+    <a:masterClrMapping/>
+  </p:clrMapOvr>
+</p:sld>
+</file>
+
+<file path=ppt/slides/slide15.xml><?xml version="1.0" encoding="utf-8"?>
+<p:sld xmlns:a="http://schemas.openxmlformats.org/drawingml/2006/main" xmlns:r="http://schemas.openxmlformats.org/officeDocument/2006/relationships" xmlns:p="http://schemas.openxmlformats.org/presentationml/2006/main">
+  <p:cSld>
+    <p:spTree>
+      <p:nvGrpSpPr>
+        <p:cNvPr id="1" name=""/>
+        <p:cNvGrpSpPr/>
+        <p:nvPr/>
+      </p:nvGrpSpPr>
+      <p:grpSpPr>
+        <a:xfrm>
+          <a:off x="0" y="0"/>
+          <a:ext cx="0" cy="0"/>
+          <a:chOff x="0" y="0"/>
+          <a:chExt cx="0" cy="0"/>
+        </a:xfrm>
+      </p:grpSpPr>
+      <p:sp>
+        <p:nvSpPr>
+          <p:cNvPr id="2" name="Title 1"/>
+          <p:cNvSpPr>
+            <a:spLocks noGrp="1"/>
+          </p:cNvSpPr>
+          <p:nvPr>
+            <p:ph type="title"/>
+          </p:nvPr>
+        </p:nvSpPr>
+        <p:spPr>
+          <a:xfrm>
+            <a:off x="457200" y="224304"/>
+            <a:ext cx="8229600" cy="990600"/>
+          </a:xfrm>
+        </p:spPr>
+        <p:txBody>
+          <a:bodyPr/>
+          <a:lstStyle/>
+          <a:p>
+            <a:r>
+              <a:rPr lang="en-US" dirty="0" smtClean="0"/>
+              <a:t>Clone Membership</a:t>
+            </a:r>
+            <a:endParaRPr lang="en-US" dirty="0"/>
+          </a:p>
+        </p:txBody>
+      </p:sp>
+      <p:pic>
+        <p:nvPicPr>
+          <p:cNvPr id="7171" name="Picture 3"/>
+          <p:cNvPicPr>
+            <a:picLocks noChangeAspect="1" noChangeArrowheads="1"/>
+          </p:cNvPicPr>
+          <p:nvPr/>
+        </p:nvPicPr>
+        <p:blipFill>
+          <a:blip r:embed="rId2">
+            <a:extLst>
+              <a:ext uri="{28A0092B-C50C-407E-A947-70E740481C1C}">
+                <a14:useLocalDpi xmlns:a14="http://schemas.microsoft.com/office/drawing/2010/main" val="0"/>
+              </a:ext>
+            </a:extLst>
+          </a:blip>
+          <a:srcRect/>
+          <a:stretch>
+            <a:fillRect/>
+          </a:stretch>
+        </p:blipFill>
+        <p:spPr bwMode="auto">
+          <a:xfrm>
+            <a:off x="857206" y="1024207"/>
+            <a:ext cx="7462546" cy="2430043"/>
+          </a:xfrm>
+          <a:prstGeom prst="rect">
+            <a:avLst/>
+          </a:prstGeom>
+          <a:noFill/>
+          <a:ln>
+            <a:noFill/>
+          </a:ln>
+          <a:extLst>
+            <a:ext uri="{909E8E84-426E-40DD-AFC4-6F175D3DCCD1}">
+              <a14:hiddenFill xmlns:a14="http://schemas.microsoft.com/office/drawing/2010/main">
+                <a:solidFill>
+                  <a:schemeClr val="accent1"/>
+                </a:solidFill>
+              </a14:hiddenFill>
+            </a:ext>
+            <a:ext uri="{91240B29-F687-4F45-9708-019B960494DF}">
+              <a14:hiddenLine xmlns:a14="http://schemas.microsoft.com/office/drawing/2010/main" w="9525">
+                <a:solidFill>
+                  <a:schemeClr val="tx1"/>
+                </a:solidFill>
+                <a:miter lim="800000"/>
+                <a:headEnd/>
+                <a:tailEnd/>
+              </a14:hiddenLine>
+            </a:ext>
+          </a:extLst>
+        </p:spPr>
+      </p:pic>
+      <p:pic>
+        <p:nvPicPr>
+          <p:cNvPr id="7172" name="Picture 4"/>
+          <p:cNvPicPr>
+            <a:picLocks noChangeAspect="1" noChangeArrowheads="1"/>
+          </p:cNvPicPr>
+          <p:nvPr/>
+        </p:nvPicPr>
+        <p:blipFill>
+          <a:blip r:embed="rId3">
+            <a:extLst>
+              <a:ext uri="{28A0092B-C50C-407E-A947-70E740481C1C}">
+                <a14:useLocalDpi xmlns:a14="http://schemas.microsoft.com/office/drawing/2010/main" val="0"/>
+              </a:ext>
+            </a:extLst>
+          </a:blip>
+          <a:srcRect/>
+          <a:stretch>
+            <a:fillRect/>
+          </a:stretch>
+        </p:blipFill>
+        <p:spPr bwMode="auto">
+          <a:xfrm>
+            <a:off x="857206" y="3467129"/>
+            <a:ext cx="7462546" cy="3238261"/>
+          </a:xfrm>
+          <a:prstGeom prst="rect">
+            <a:avLst/>
+          </a:prstGeom>
+          <a:noFill/>
+          <a:ln>
+            <a:noFill/>
+          </a:ln>
+          <a:extLst>
+            <a:ext uri="{909E8E84-426E-40DD-AFC4-6F175D3DCCD1}">
+              <a14:hiddenFill xmlns:a14="http://schemas.microsoft.com/office/drawing/2010/main">
+                <a:solidFill>
+                  <a:schemeClr val="accent1"/>
+                </a:solidFill>
+              </a14:hiddenFill>
+            </a:ext>
+            <a:ext uri="{91240B29-F687-4F45-9708-019B960494DF}">
+              <a14:hiddenLine xmlns:a14="http://schemas.microsoft.com/office/drawing/2010/main" w="9525">
+                <a:solidFill>
+                  <a:schemeClr val="tx1"/>
+                </a:solidFill>
+                <a:miter lim="800000"/>
+                <a:headEnd/>
+                <a:tailEnd/>
+              </a14:hiddenLine>
+            </a:ext>
+          </a:extLst>
+        </p:spPr>
+      </p:pic>
+    </p:spTree>
+    <p:extLst>
+      <p:ext uri="{BB962C8B-B14F-4D97-AF65-F5344CB8AC3E}">
+        <p14:creationId xmlns:p14="http://schemas.microsoft.com/office/powerpoint/2010/main" val="3246534787"/>
+      </p:ext>
+    </p:extLst>
+  </p:cSld>
+  <p:clrMapOvr>
+    <a:masterClrMapping/>
+  </p:clrMapOvr>
+</p:sld>
+</file>
+
+<file path=ppt/slides/slide16.xml><?xml version="1.0" encoding="utf-8"?>
+<p:sld xmlns:a="http://schemas.openxmlformats.org/drawingml/2006/main" xmlns:r="http://schemas.openxmlformats.org/officeDocument/2006/relationships" xmlns:p="http://schemas.openxmlformats.org/presentationml/2006/main">
+  <p:cSld>
+    <p:spTree>
+      <p:nvGrpSpPr>
+        <p:cNvPr id="1" name=""/>
+        <p:cNvGrpSpPr/>
+        <p:nvPr/>
+      </p:nvGrpSpPr>
+      <p:grpSpPr>
+        <a:xfrm>
+          <a:off x="0" y="0"/>
+          <a:ext cx="0" cy="0"/>
+          <a:chOff x="0" y="0"/>
+          <a:chExt cx="0" cy="0"/>
+        </a:xfrm>
+      </p:grpSpPr>
+      <p:sp>
+        <p:nvSpPr>
+          <p:cNvPr id="2" name="Title 1"/>
+          <p:cNvSpPr>
+            <a:spLocks noGrp="1"/>
+          </p:cNvSpPr>
+          <p:nvPr>
+            <p:ph type="title"/>
+          </p:nvPr>
+        </p:nvSpPr>
+        <p:spPr/>
+        <p:txBody>
+          <a:bodyPr/>
+          <a:lstStyle/>
+          <a:p>
+            <a:endParaRPr lang="en-US" dirty="0"/>
+          </a:p>
+        </p:txBody>
+      </p:sp>
+      <p:pic>
+        <p:nvPicPr>
+          <p:cNvPr id="8194" name="Picture 2"/>
+          <p:cNvPicPr>
+            <a:picLocks noChangeAspect="1" noChangeArrowheads="1"/>
+          </p:cNvPicPr>
+          <p:nvPr/>
+        </p:nvPicPr>
+        <p:blipFill>
+          <a:blip r:embed="rId2">
+            <a:extLst>
+              <a:ext uri="{28A0092B-C50C-407E-A947-70E740481C1C}">
+                <a14:useLocalDpi xmlns:a14="http://schemas.microsoft.com/office/drawing/2010/main" val="0"/>
+              </a:ext>
+            </a:extLst>
+          </a:blip>
+          <a:srcRect/>
+          <a:stretch>
+            <a:fillRect/>
+          </a:stretch>
+        </p:blipFill>
+        <p:spPr bwMode="auto">
+          <a:xfrm>
+            <a:off x="607409" y="2295077"/>
+            <a:ext cx="7156450" cy="3117850"/>
+          </a:xfrm>
+          <a:prstGeom prst="rect">
+            <a:avLst/>
+          </a:prstGeom>
+          <a:noFill/>
+          <a:ln>
+            <a:noFill/>
+          </a:ln>
+          <a:extLst>
+            <a:ext uri="{909E8E84-426E-40DD-AFC4-6F175D3DCCD1}">
+              <a14:hiddenFill xmlns:a14="http://schemas.microsoft.com/office/drawing/2010/main">
+                <a:solidFill>
+                  <a:schemeClr val="accent1"/>
+                </a:solidFill>
+              </a14:hiddenFill>
+            </a:ext>
+            <a:ext uri="{91240B29-F687-4F45-9708-019B960494DF}">
+              <a14:hiddenLine xmlns:a14="http://schemas.microsoft.com/office/drawing/2010/main" w="9525">
+                <a:solidFill>
+                  <a:schemeClr val="tx1"/>
+                </a:solidFill>
+                <a:miter lim="800000"/>
+                <a:headEnd/>
+                <a:tailEnd/>
+              </a14:hiddenLine>
+            </a:ext>
+          </a:extLst>
+        </p:spPr>
+      </p:pic>
+    </p:spTree>
+    <p:extLst>
+      <p:ext uri="{BB962C8B-B14F-4D97-AF65-F5344CB8AC3E}">
+        <p14:creationId xmlns:p14="http://schemas.microsoft.com/office/powerpoint/2010/main" val="1018938704"/>
+      </p:ext>
+    </p:extLst>
+  </p:cSld>
+  <p:clrMapOvr>
+    <a:masterClrMapping/>
+  </p:clrMapOvr>
+</p:sld>
+</file>
+
+<file path=ppt/slides/slide17.xml><?xml version="1.0" encoding="utf-8"?>
+<p:sld xmlns:a="http://schemas.openxmlformats.org/drawingml/2006/main" xmlns:r="http://schemas.openxmlformats.org/officeDocument/2006/relationships" xmlns:p="http://schemas.openxmlformats.org/presentationml/2006/main">
+  <p:cSld>
+    <p:spTree>
+      <p:nvGrpSpPr>
+        <p:cNvPr id="1" name=""/>
+        <p:cNvGrpSpPr/>
+        <p:nvPr/>
+      </p:nvGrpSpPr>
+      <p:grpSpPr>
+        <a:xfrm>
+          <a:off x="0" y="0"/>
+          <a:ext cx="0" cy="0"/>
+          <a:chOff x="0" y="0"/>
+          <a:chExt cx="0" cy="0"/>
+        </a:xfrm>
+      </p:grpSpPr>
+      <p:sp>
+        <p:nvSpPr>
+          <p:cNvPr id="2" name="Title 1"/>
+          <p:cNvSpPr>
+            <a:spLocks noGrp="1"/>
+          </p:cNvSpPr>
+          <p:nvPr>
+            <p:ph type="title"/>
+          </p:nvPr>
+        </p:nvSpPr>
+        <p:spPr/>
+        <p:txBody>
+          <a:bodyPr/>
+          <a:lstStyle/>
+          <a:p>
+            <a:r>
+              <a:rPr lang="en-US" dirty="0" smtClean="0"/>
+              <a:t>Inspect Employee</a:t>
+            </a:r>
+            <a:endParaRPr lang="en-US" dirty="0"/>
+          </a:p>
+        </p:txBody>
+      </p:sp>
+      <p:pic>
+        <p:nvPicPr>
+          <p:cNvPr id="4" name="Picture 2"/>
+          <p:cNvPicPr>
+            <a:picLocks noChangeAspect="1" noChangeArrowheads="1"/>
+          </p:cNvPicPr>
+          <p:nvPr/>
+        </p:nvPicPr>
+        <p:blipFill>
+          <a:blip r:embed="rId2">
+            <a:extLst>
+              <a:ext uri="{28A0092B-C50C-407E-A947-70E740481C1C}">
+                <a14:useLocalDpi xmlns:a14="http://schemas.microsoft.com/office/drawing/2010/main" val="0"/>
+              </a:ext>
+            </a:extLst>
+          </a:blip>
+          <a:srcRect/>
+          <a:stretch>
+            <a:fillRect/>
+          </a:stretch>
+        </p:blipFill>
+        <p:spPr bwMode="auto">
+          <a:xfrm>
+            <a:off x="263212" y="1764406"/>
+            <a:ext cx="4331166" cy="4653700"/>
+          </a:xfrm>
+          <a:prstGeom prst="rect">
+            <a:avLst/>
+          </a:prstGeom>
+          <a:noFill/>
+          <a:ln>
+            <a:noFill/>
+          </a:ln>
+          <a:extLst>
+            <a:ext uri="{909E8E84-426E-40DD-AFC4-6F175D3DCCD1}">
+              <a14:hiddenFill xmlns:a14="http://schemas.microsoft.com/office/drawing/2010/main">
+                <a:solidFill>
+                  <a:schemeClr val="accent1"/>
+                </a:solidFill>
+              </a14:hiddenFill>
+            </a:ext>
+            <a:ext uri="{91240B29-F687-4F45-9708-019B960494DF}">
+              <a14:hiddenLine xmlns:a14="http://schemas.microsoft.com/office/drawing/2010/main" w="9525">
+                <a:solidFill>
+                  <a:schemeClr val="tx1"/>
+                </a:solidFill>
+                <a:miter lim="800000"/>
+                <a:headEnd/>
+                <a:tailEnd/>
+              </a14:hiddenLine>
+            </a:ext>
+          </a:extLst>
+        </p:spPr>
+      </p:pic>
+      <p:pic>
+        <p:nvPicPr>
+          <p:cNvPr id="6" name="Picture 2"/>
+          <p:cNvPicPr>
+            <a:picLocks noChangeAspect="1" noChangeArrowheads="1"/>
+          </p:cNvPicPr>
+          <p:nvPr/>
+        </p:nvPicPr>
+        <p:blipFill>
+          <a:blip r:embed="rId3">
+            <a:extLst>
+              <a:ext uri="{28A0092B-C50C-407E-A947-70E740481C1C}">
+                <a14:useLocalDpi xmlns:a14="http://schemas.microsoft.com/office/drawing/2010/main" val="0"/>
+              </a:ext>
+            </a:extLst>
+          </a:blip>
+          <a:srcRect/>
+          <a:stretch>
+            <a:fillRect/>
+          </a:stretch>
+        </p:blipFill>
+        <p:spPr bwMode="auto">
+          <a:xfrm>
+            <a:off x="3021223" y="3589851"/>
+            <a:ext cx="5942473" cy="3190875"/>
+          </a:xfrm>
+          <a:prstGeom prst="rect">
+            <a:avLst/>
+          </a:prstGeom>
+          <a:noFill/>
+          <a:ln>
+            <a:noFill/>
+          </a:ln>
+          <a:extLst>
+            <a:ext uri="{909E8E84-426E-40DD-AFC4-6F175D3DCCD1}">
+              <a14:hiddenFill xmlns:a14="http://schemas.microsoft.com/office/drawing/2010/main">
+                <a:solidFill>
+                  <a:schemeClr val="accent1"/>
+                </a:solidFill>
+              </a14:hiddenFill>
+            </a:ext>
+            <a:ext uri="{91240B29-F687-4F45-9708-019B960494DF}">
+              <a14:hiddenLine xmlns:a14="http://schemas.microsoft.com/office/drawing/2010/main" w="9525">
+                <a:solidFill>
+                  <a:schemeClr val="tx1"/>
+                </a:solidFill>
+                <a:miter lim="800000"/>
+                <a:headEnd/>
+                <a:tailEnd/>
+              </a14:hiddenLine>
+            </a:ext>
+          </a:extLst>
+        </p:spPr>
+      </p:pic>
+      <p:pic>
+        <p:nvPicPr>
+          <p:cNvPr id="9218" name="Picture 2"/>
+          <p:cNvPicPr>
+            <a:picLocks noChangeAspect="1" noChangeArrowheads="1"/>
+          </p:cNvPicPr>
+          <p:nvPr/>
+        </p:nvPicPr>
+        <p:blipFill>
+          <a:blip r:embed="rId4">
+            <a:extLst>
+              <a:ext uri="{28A0092B-C50C-407E-A947-70E740481C1C}">
+                <a14:useLocalDpi xmlns:a14="http://schemas.microsoft.com/office/drawing/2010/main" val="0"/>
+              </a:ext>
+            </a:extLst>
+          </a:blip>
+          <a:srcRect/>
+          <a:stretch>
+            <a:fillRect/>
+          </a:stretch>
+        </p:blipFill>
+        <p:spPr bwMode="auto">
+          <a:xfrm>
+            <a:off x="122349" y="3615609"/>
+            <a:ext cx="3219450" cy="3190875"/>
+          </a:xfrm>
+          <a:prstGeom prst="rect">
+            <a:avLst/>
+          </a:prstGeom>
+          <a:noFill/>
+          <a:ln>
+            <a:noFill/>
+          </a:ln>
+          <a:extLst>
+            <a:ext uri="{909E8E84-426E-40DD-AFC4-6F175D3DCCD1}">
+              <a14:hiddenFill xmlns:a14="http://schemas.microsoft.com/office/drawing/2010/main">
+                <a:solidFill>
+                  <a:schemeClr val="accent1"/>
+                </a:solidFill>
+              </a14:hiddenFill>
+            </a:ext>
+            <a:ext uri="{91240B29-F687-4F45-9708-019B960494DF}">
+              <a14:hiddenLine xmlns:a14="http://schemas.microsoft.com/office/drawing/2010/main" w="9525">
+                <a:solidFill>
+                  <a:schemeClr val="tx1"/>
+                </a:solidFill>
+                <a:miter lim="800000"/>
+                <a:headEnd/>
+                <a:tailEnd/>
+              </a14:hiddenLine>
+            </a:ext>
+          </a:extLst>
+        </p:spPr>
+      </p:pic>
+      <p:sp>
+        <p:nvSpPr>
+          <p:cNvPr id="8" name="TextBox 7"/>
+          <p:cNvSpPr txBox="1"/>
+          <p:nvPr/>
+        </p:nvSpPr>
+        <p:spPr>
+          <a:xfrm>
+            <a:off x="4748924" y="2075886"/>
+            <a:ext cx="4092422" cy="646331"/>
+          </a:xfrm>
+          <a:prstGeom prst="rect">
+            <a:avLst/>
+          </a:prstGeom>
+          <a:noFill/>
+        </p:spPr>
+        <p:txBody>
+          <a:bodyPr wrap="square" rtlCol="0">
+            <a:spAutoFit/>
+          </a:bodyPr>
+          <a:lstStyle/>
+          <a:p>
+            <a:pPr marL="285750" indent="-285750">
+              <a:buFont typeface="Arial" panose="020B0604020202020204" pitchFamily="34" charset="0"/>
+              <a:buChar char="•"/>
+            </a:pPr>
+            <a:r>
+              <a:rPr lang="en-US" dirty="0" smtClean="0"/>
+              <a:t>See all lists employee is on</a:t>
+            </a:r>
+          </a:p>
+          <a:p>
+            <a:pPr marL="285750" indent="-285750">
+              <a:buFont typeface="Arial" panose="020B0604020202020204" pitchFamily="34" charset="0"/>
+              <a:buChar char="•"/>
+            </a:pPr>
+            <a:r>
+              <a:rPr lang="en-US" dirty="0" smtClean="0"/>
+              <a:t>Remove employee from all lists</a:t>
+            </a:r>
+            <a:endParaRPr lang="en-US" dirty="0"/>
+          </a:p>
+        </p:txBody>
+      </p:sp>
+    </p:spTree>
+    <p:extLst>
+      <p:ext uri="{BB962C8B-B14F-4D97-AF65-F5344CB8AC3E}">
+        <p14:creationId xmlns:p14="http://schemas.microsoft.com/office/powerpoint/2010/main" val="1063960591"/>
+      </p:ext>
+    </p:extLst>
+  </p:cSld>
+  <p:clrMapOvr>
+    <a:masterClrMapping/>
+  </p:clrMapOvr>
+</p:sld>
+</file>
+
+<file path=ppt/slides/slide18.xml><?xml version="1.0" encoding="utf-8"?>
+<p:sld xmlns:a="http://schemas.openxmlformats.org/drawingml/2006/main" xmlns:r="http://schemas.openxmlformats.org/officeDocument/2006/relationships" xmlns:p="http://schemas.openxmlformats.org/presentationml/2006/main">
+  <p:cSld>
+    <p:spTree>
+      <p:nvGrpSpPr>
+        <p:cNvPr id="1" name=""/>
+        <p:cNvGrpSpPr/>
+        <p:nvPr/>
+      </p:nvGrpSpPr>
+      <p:grpSpPr>
+        <a:xfrm>
+          <a:off x="0" y="0"/>
+          <a:ext cx="0" cy="0"/>
+          <a:chOff x="0" y="0"/>
+          <a:chExt cx="0" cy="0"/>
+        </a:xfrm>
+      </p:grpSpPr>
+      <p:sp>
+        <p:nvSpPr>
+          <p:cNvPr id="2" name="Title 1"/>
+          <p:cNvSpPr>
+            <a:spLocks noGrp="1"/>
+          </p:cNvSpPr>
+          <p:nvPr>
+            <p:ph type="title"/>
+          </p:nvPr>
+        </p:nvSpPr>
+        <p:spPr/>
+        <p:txBody>
+          <a:bodyPr/>
+          <a:lstStyle/>
+          <a:p>
+            <a:r>
+              <a:rPr lang="en-US" dirty="0" smtClean="0"/>
+              <a:t>Must Have Features</a:t>
+            </a:r>
+            <a:endParaRPr lang="en-US" dirty="0"/>
+          </a:p>
+        </p:txBody>
+      </p:sp>
+      <p:sp>
+        <p:nvSpPr>
+          <p:cNvPr id="3" name="Content Placeholder 2"/>
+          <p:cNvSpPr>
+            <a:spLocks noGrp="1"/>
+          </p:cNvSpPr>
+          <p:nvPr>
+            <p:ph idx="1"/>
+          </p:nvPr>
+        </p:nvSpPr>
+        <p:spPr/>
+        <p:txBody>
+          <a:bodyPr/>
+          <a:lstStyle/>
+          <a:p>
+            <a:r>
+              <a:rPr lang="en-US" dirty="0" smtClean="0"/>
+              <a:t>Report Downloads</a:t>
+            </a:r>
+          </a:p>
+          <a:p>
+            <a:r>
+              <a:rPr lang="en-US" dirty="0" smtClean="0"/>
+              <a:t>Data Loading</a:t>
+            </a:r>
+          </a:p>
+          <a:p>
+            <a:r>
+              <a:rPr lang="en-US" dirty="0" smtClean="0"/>
+              <a:t>Document Uploads</a:t>
+            </a:r>
+          </a:p>
+          <a:p>
+            <a:r>
+              <a:rPr lang="en-US" dirty="0" smtClean="0"/>
+              <a:t>Homepage Search Bar</a:t>
+            </a:r>
+          </a:p>
+          <a:p>
+            <a:r>
+              <a:rPr lang="en-US" dirty="0" smtClean="0"/>
+              <a:t>Region Display Selector</a:t>
+            </a:r>
+          </a:p>
+          <a:p>
+            <a:r>
+              <a:rPr lang="en-US" dirty="0" smtClean="0"/>
+              <a:t>Trees</a:t>
+            </a:r>
+          </a:p>
+          <a:p>
+            <a:r>
+              <a:rPr lang="en-US" dirty="0" smtClean="0"/>
+              <a:t>Shortcut</a:t>
+            </a:r>
+          </a:p>
+          <a:p>
+            <a:r>
+              <a:rPr lang="en-US" dirty="0" smtClean="0"/>
+              <a:t>Shuttle</a:t>
+            </a:r>
+          </a:p>
+          <a:p>
+            <a:r>
+              <a:rPr lang="en-US" dirty="0" smtClean="0"/>
+              <a:t>Group Select List</a:t>
+            </a:r>
+          </a:p>
+          <a:p>
+            <a:r>
+              <a:rPr lang="en-US" dirty="0" smtClean="0"/>
+              <a:t>Modal Branching</a:t>
+            </a:r>
+          </a:p>
+        </p:txBody>
+      </p:sp>
+    </p:spTree>
+    <p:extLst>
+      <p:ext uri="{BB962C8B-B14F-4D97-AF65-F5344CB8AC3E}">
+        <p14:creationId xmlns:p14="http://schemas.microsoft.com/office/powerpoint/2010/main" val="34625199"/>
+      </p:ext>
+    </p:extLst>
+  </p:cSld>
+  <p:clrMapOvr>
+    <a:masterClrMapping/>
+  </p:clrMapOvr>
+</p:sld>
+</file>
+
+<file path=ppt/slides/slide19.xml><?xml version="1.0" encoding="utf-8"?>
+<p:sld xmlns:a="http://schemas.openxmlformats.org/drawingml/2006/main" xmlns:r="http://schemas.openxmlformats.org/officeDocument/2006/relationships" xmlns:p="http://schemas.openxmlformats.org/presentationml/2006/main">
+  <p:cSld>
+    <p:spTree>
+      <p:nvGrpSpPr>
+        <p:cNvPr id="1" name=""/>
+        <p:cNvGrpSpPr/>
+        <p:nvPr/>
+      </p:nvGrpSpPr>
+      <p:grpSpPr>
+        <a:xfrm>
+          <a:off x="0" y="0"/>
+          <a:ext cx="0" cy="0"/>
+          <a:chOff x="0" y="0"/>
+          <a:chExt cx="0" cy="0"/>
+        </a:xfrm>
+      </p:grpSpPr>
+      <p:sp>
+        <p:nvSpPr>
+          <p:cNvPr id="2" name="Title 1"/>
+          <p:cNvSpPr>
+            <a:spLocks noGrp="1"/>
+          </p:cNvSpPr>
+          <p:nvPr>
+            <p:ph type="title"/>
+          </p:nvPr>
+        </p:nvSpPr>
+        <p:spPr/>
+        <p:txBody>
+          <a:bodyPr/>
+          <a:lstStyle/>
+          <a:p>
+            <a:r>
+              <a:rPr lang="en-US" dirty="0" smtClean="0"/>
+              <a:t>Report Downloads</a:t>
+            </a:r>
+            <a:endParaRPr lang="en-US" dirty="0"/>
+          </a:p>
+        </p:txBody>
+      </p:sp>
+      <p:pic>
+        <p:nvPicPr>
+          <p:cNvPr id="4" name="Content Placeholder 3" descr="Screen Shot 2015-04-28 at 5.07.32 PM.png"/>
+          <p:cNvPicPr>
+            <a:picLocks noGrp="1" noChangeAspect="1"/>
+          </p:cNvPicPr>
+          <p:nvPr>
+            <p:ph idx="1"/>
+          </p:nvPr>
+        </p:nvPicPr>
+        <p:blipFill>
+          <a:blip r:embed="rId3">
+            <a:extLst>
+              <a:ext uri="{28A0092B-C50C-407E-A947-70E740481C1C}">
+                <a14:useLocalDpi xmlns:a14="http://schemas.microsoft.com/office/drawing/2010/main" val="0"/>
+              </a:ext>
+            </a:extLst>
+          </a:blip>
+          <a:srcRect t="-11550" b="-11550"/>
+          <a:stretch>
+            <a:fillRect/>
+          </a:stretch>
+        </p:blipFill>
+        <p:spPr/>
+      </p:pic>
+      <p:sp>
+        <p:nvSpPr>
+          <p:cNvPr id="5" name="Donut 4"/>
+          <p:cNvSpPr/>
+          <p:nvPr/>
+        </p:nvSpPr>
+        <p:spPr>
+          <a:xfrm>
+            <a:off x="6626500" y="1725693"/>
+            <a:ext cx="1888634" cy="1009367"/>
+          </a:xfrm>
+          <a:prstGeom prst="donut">
+            <a:avLst>
+              <a:gd name="adj" fmla="val 7435"/>
+            </a:avLst>
+          </a:prstGeom>
+          <a:solidFill>
+            <a:schemeClr val="tx1"/>
+          </a:solidFill>
+          <a:ln>
+            <a:noFill/>
+          </a:ln>
+        </p:spPr>
+        <p:style>
+          <a:lnRef idx="1">
+            <a:schemeClr val="accent1"/>
+          </a:lnRef>
+          <a:fillRef idx="3">
+            <a:schemeClr val="accent1"/>
+          </a:fillRef>
+          <a:effectRef idx="2">
+            <a:schemeClr val="accent1"/>
+          </a:effectRef>
+          <a:fontRef idx="minor">
+            <a:schemeClr val="lt1"/>
+          </a:fontRef>
+        </p:style>
+        <p:txBody>
+          <a:bodyPr rtlCol="0" anchor="ctr"/>
+          <a:lstStyle/>
+          <a:p>
+            <a:pPr algn="ctr"/>
+            <a:endParaRPr lang="en-US">
+              <a:solidFill>
+                <a:schemeClr val="tx1"/>
+              </a:solidFill>
+            </a:endParaRPr>
+          </a:p>
+        </p:txBody>
+      </p:sp>
+      <p:pic>
+        <p:nvPicPr>
+          <p:cNvPr id="6" name="Picture 5" descr="Screen Shot 2015-04-28 at 5.11.24 PM.png"/>
+          <p:cNvPicPr>
+            <a:picLocks noChangeAspect="1"/>
+          </p:cNvPicPr>
+          <p:nvPr/>
+        </p:nvPicPr>
+        <p:blipFill>
+          <a:blip r:embed="rId4">
+            <a:extLst>
+              <a:ext uri="{28A0092B-C50C-407E-A947-70E740481C1C}">
+                <a14:useLocalDpi xmlns:a14="http://schemas.microsoft.com/office/drawing/2010/main" val="0"/>
+              </a:ext>
+            </a:extLst>
+          </a:blip>
+          <a:stretch>
+            <a:fillRect/>
+          </a:stretch>
+        </p:blipFill>
+        <p:spPr>
+          <a:xfrm>
+            <a:off x="3210200" y="3483568"/>
+            <a:ext cx="3416300" cy="2222500"/>
+          </a:xfrm>
+          <a:prstGeom prst="rect">
+            <a:avLst/>
+          </a:prstGeom>
+          <a:ln>
+            <a:noFill/>
+          </a:ln>
+          <a:effectLst>
+            <a:outerShdw blurRad="292100" dist="139700" dir="2700000" algn="tl" rotWithShape="0">
+              <a:srgbClr val="333333">
+                <a:alpha val="65000"/>
+              </a:srgbClr>
+            </a:outerShdw>
+          </a:effectLst>
+        </p:spPr>
+      </p:pic>
+      <p:sp>
+        <p:nvSpPr>
+          <p:cNvPr id="11" name="Bent Arrow 10"/>
+          <p:cNvSpPr/>
+          <p:nvPr/>
+        </p:nvSpPr>
+        <p:spPr>
+          <a:xfrm rot="9874580">
+            <a:off x="6382280" y="3076941"/>
+            <a:ext cx="1693258" cy="1204729"/>
+          </a:xfrm>
+          <a:prstGeom prst="bentArrow">
+            <a:avLst>
+              <a:gd name="adj1" fmla="val 6719"/>
+              <a:gd name="adj2" fmla="val 21774"/>
+              <a:gd name="adj3" fmla="val 20699"/>
+              <a:gd name="adj4" fmla="val 70633"/>
+            </a:avLst>
+          </a:prstGeom>
+          <a:solidFill>
+            <a:srgbClr val="292934"/>
+          </a:solidFill>
+          <a:ln>
+            <a:noFill/>
+          </a:ln>
+        </p:spPr>
+        <p:style>
+          <a:lnRef idx="1">
+            <a:schemeClr val="accent1"/>
+          </a:lnRef>
+          <a:fillRef idx="3">
+            <a:schemeClr val="accent1"/>
+          </a:fillRef>
+          <a:effectRef idx="2">
+            <a:schemeClr val="accent1"/>
+          </a:effectRef>
+          <a:fontRef idx="minor">
+            <a:schemeClr val="lt1"/>
+          </a:fontRef>
+        </p:style>
+        <p:txBody>
+          <a:bodyPr rtlCol="0" anchor="ctr"/>
+          <a:lstStyle/>
+          <a:p>
+            <a:pPr algn="ctr"/>
+            <a:endParaRPr lang="en-US">
+              <a:solidFill>
+                <a:schemeClr val="tx1"/>
+              </a:solidFill>
+            </a:endParaRPr>
+          </a:p>
+        </p:txBody>
+      </p:sp>
+    </p:spTree>
+    <p:extLst>
+      <p:ext uri="{BB962C8B-B14F-4D97-AF65-F5344CB8AC3E}">
+        <p14:creationId xmlns:p14="http://schemas.microsoft.com/office/powerpoint/2010/main" val="370475556"/>
+      </p:ext>
+    </p:extLst>
+  </p:cSld>
+  <p:clrMapOvr>
+    <a:masterClrMapping/>
+  </p:clrMapOvr>
+</p:sld>
+</file>
+
+<file path=ppt/slides/slide2.xml><?xml version="1.0" encoding="utf-8"?>
+<p:sld xmlns:a="http://schemas.openxmlformats.org/drawingml/2006/main" xmlns:r="http://schemas.openxmlformats.org/officeDocument/2006/relationships" xmlns:p="http://schemas.openxmlformats.org/presentationml/2006/main">
+  <p:cSld>
+    <p:spTree>
+      <p:nvGrpSpPr>
+        <p:cNvPr id="1" name=""/>
+        <p:cNvGrpSpPr/>
+        <p:nvPr/>
+      </p:nvGrpSpPr>
+      <p:grpSpPr>
+        <a:xfrm>
+          <a:off x="0" y="0"/>
+          <a:ext cx="0" cy="0"/>
+          <a:chOff x="0" y="0"/>
+          <a:chExt cx="0" cy="0"/>
+        </a:xfrm>
+      </p:grpSpPr>
+      <p:sp>
+        <p:nvSpPr>
+          <p:cNvPr id="2" name="Title 1"/>
+          <p:cNvSpPr>
+            <a:spLocks noGrp="1"/>
+          </p:cNvSpPr>
+          <p:nvPr>
+            <p:ph type="title"/>
+          </p:nvPr>
+        </p:nvSpPr>
+        <p:spPr/>
+        <p:txBody>
+          <a:bodyPr/>
+          <a:lstStyle/>
+          <a:p>
+            <a:r>
+              <a:rPr lang="en-US" dirty="0" smtClean="0"/>
+              <a:t>Conceptual Model</a:t>
+            </a:r>
+            <a:endParaRPr lang="en-US" dirty="0"/>
+          </a:p>
+        </p:txBody>
+      </p:sp>
+      <p:sp>
+        <p:nvSpPr>
+          <p:cNvPr id="3" name="Content Placeholder 2"/>
+          <p:cNvSpPr>
+            <a:spLocks noGrp="1"/>
+          </p:cNvSpPr>
+          <p:nvPr>
+            <p:ph idx="1"/>
+          </p:nvPr>
+        </p:nvSpPr>
+        <p:spPr/>
+        <p:txBody>
+          <a:bodyPr/>
+          <a:lstStyle/>
+          <a:p>
+            <a:endParaRPr lang="en-US" dirty="0"/>
+          </a:p>
+        </p:txBody>
+      </p:sp>
+    </p:spTree>
+    <p:extLst>
+      <p:ext uri="{BB962C8B-B14F-4D97-AF65-F5344CB8AC3E}">
+        <p14:creationId xmlns:p14="http://schemas.microsoft.com/office/powerpoint/2010/main" val="1705706920"/>
+      </p:ext>
+    </p:extLst>
+  </p:cSld>
+  <p:clrMapOvr>
+    <a:masterClrMapping/>
+  </p:clrMapOvr>
+</p:sld>
+</file>
+
+<file path=ppt/slides/slide20.xml><?xml version="1.0" encoding="utf-8"?>
+<p:sld xmlns:a="http://schemas.openxmlformats.org/drawingml/2006/main" xmlns:r="http://schemas.openxmlformats.org/officeDocument/2006/relationships" xmlns:p="http://schemas.openxmlformats.org/presentationml/2006/main">
+  <p:cSld>
+    <p:spTree>
+      <p:nvGrpSpPr>
+        <p:cNvPr id="1" name=""/>
+        <p:cNvGrpSpPr/>
+        <p:nvPr/>
+      </p:nvGrpSpPr>
+      <p:grpSpPr>
+        <a:xfrm>
+          <a:off x="0" y="0"/>
+          <a:ext cx="0" cy="0"/>
+          <a:chOff x="0" y="0"/>
+          <a:chExt cx="0" cy="0"/>
+        </a:xfrm>
+      </p:grpSpPr>
+      <p:sp>
+        <p:nvSpPr>
+          <p:cNvPr id="2" name="Title 1"/>
+          <p:cNvSpPr>
+            <a:spLocks noGrp="1"/>
+          </p:cNvSpPr>
+          <p:nvPr>
+            <p:ph type="title"/>
+          </p:nvPr>
+        </p:nvSpPr>
+        <p:spPr/>
+        <p:txBody>
+          <a:bodyPr/>
+          <a:lstStyle/>
+          <a:p>
+            <a:r>
+              <a:rPr lang="en-US" dirty="0" smtClean="0"/>
+              <a:t>Data Loading</a:t>
+            </a:r>
+            <a:endParaRPr lang="en-US" dirty="0"/>
+          </a:p>
+        </p:txBody>
+      </p:sp>
+      <p:pic>
+        <p:nvPicPr>
+          <p:cNvPr id="4" name="Content Placeholder 3" descr="Screen Shot 2015-04-28 at 5.16.21 PM.png"/>
+          <p:cNvPicPr>
+            <a:picLocks noGrp="1" noChangeAspect="1"/>
+          </p:cNvPicPr>
+          <p:nvPr>
+            <p:ph idx="1"/>
+          </p:nvPr>
+        </p:nvPicPr>
+        <p:blipFill>
+          <a:blip r:embed="rId3">
+            <a:extLst>
+              <a:ext uri="{28A0092B-C50C-407E-A947-70E740481C1C}">
+                <a14:useLocalDpi xmlns:a14="http://schemas.microsoft.com/office/drawing/2010/main" val="0"/>
+              </a:ext>
+            </a:extLst>
+          </a:blip>
+          <a:srcRect l="-11238" r="-11238"/>
+          <a:stretch>
+            <a:fillRect/>
+          </a:stretch>
+        </p:blipFill>
+        <p:spPr/>
+      </p:pic>
+    </p:spTree>
+    <p:extLst>
+      <p:ext uri="{BB962C8B-B14F-4D97-AF65-F5344CB8AC3E}">
+        <p14:creationId xmlns:p14="http://schemas.microsoft.com/office/powerpoint/2010/main" val="318661808"/>
+      </p:ext>
+    </p:extLst>
+  </p:cSld>
+  <p:clrMapOvr>
+    <a:masterClrMapping/>
+  </p:clrMapOvr>
+</p:sld>
+</file>
+
+<file path=ppt/slides/slide21.xml><?xml version="1.0" encoding="utf-8"?>
+<p:sld xmlns:a="http://schemas.openxmlformats.org/drawingml/2006/main" xmlns:r="http://schemas.openxmlformats.org/officeDocument/2006/relationships" xmlns:p="http://schemas.openxmlformats.org/presentationml/2006/main">
+  <p:cSld>
+    <p:spTree>
+      <p:nvGrpSpPr>
+        <p:cNvPr id="1" name=""/>
+        <p:cNvGrpSpPr/>
+        <p:nvPr/>
+      </p:nvGrpSpPr>
+      <p:grpSpPr>
+        <a:xfrm>
+          <a:off x="0" y="0"/>
+          <a:ext cx="0" cy="0"/>
+          <a:chOff x="0" y="0"/>
+          <a:chExt cx="0" cy="0"/>
+        </a:xfrm>
+      </p:grpSpPr>
+      <p:sp>
+        <p:nvSpPr>
+          <p:cNvPr id="2" name="Title 1"/>
+          <p:cNvSpPr>
+            <a:spLocks noGrp="1"/>
+          </p:cNvSpPr>
+          <p:nvPr>
+            <p:ph type="title"/>
+          </p:nvPr>
+        </p:nvSpPr>
+        <p:spPr/>
+        <p:txBody>
+          <a:bodyPr/>
+          <a:lstStyle/>
+          <a:p>
+            <a:r>
+              <a:rPr lang="en-US" dirty="0" smtClean="0"/>
+              <a:t>Document Uploads</a:t>
+            </a:r>
+            <a:endParaRPr lang="en-US" dirty="0"/>
+          </a:p>
+        </p:txBody>
+      </p:sp>
+      <p:sp>
+        <p:nvSpPr>
+          <p:cNvPr id="3" name="Content Placeholder 2"/>
+          <p:cNvSpPr>
+            <a:spLocks noGrp="1"/>
+          </p:cNvSpPr>
+          <p:nvPr>
+            <p:ph idx="1"/>
+          </p:nvPr>
+        </p:nvSpPr>
+        <p:spPr/>
+        <p:txBody>
+          <a:bodyPr/>
+          <a:lstStyle/>
+          <a:p>
+            <a:endParaRPr lang="en-US"/>
+          </a:p>
+        </p:txBody>
+      </p:sp>
+    </p:spTree>
+    <p:extLst>
+      <p:ext uri="{BB962C8B-B14F-4D97-AF65-F5344CB8AC3E}">
+        <p14:creationId xmlns:p14="http://schemas.microsoft.com/office/powerpoint/2010/main" val="2786563422"/>
+      </p:ext>
+    </p:extLst>
+  </p:cSld>
+  <p:clrMapOvr>
+    <a:masterClrMapping/>
+  </p:clrMapOvr>
+</p:sld>
+</file>
+
+<file path=ppt/slides/slide22.xml><?xml version="1.0" encoding="utf-8"?>
+<p:sld xmlns:a="http://schemas.openxmlformats.org/drawingml/2006/main" xmlns:r="http://schemas.openxmlformats.org/officeDocument/2006/relationships" xmlns:p="http://schemas.openxmlformats.org/presentationml/2006/main">
+  <p:cSld>
+    <p:spTree>
+      <p:nvGrpSpPr>
+        <p:cNvPr id="1" name=""/>
+        <p:cNvGrpSpPr/>
+        <p:nvPr/>
+      </p:nvGrpSpPr>
+      <p:grpSpPr>
+        <a:xfrm>
+          <a:off x="0" y="0"/>
+          <a:ext cx="0" cy="0"/>
+          <a:chOff x="0" y="0"/>
+          <a:chExt cx="0" cy="0"/>
+        </a:xfrm>
+      </p:grpSpPr>
+      <p:sp>
+        <p:nvSpPr>
+          <p:cNvPr id="2" name="Title 1"/>
+          <p:cNvSpPr>
+            <a:spLocks noGrp="1"/>
+          </p:cNvSpPr>
+          <p:nvPr>
+            <p:ph type="title"/>
+          </p:nvPr>
+        </p:nvSpPr>
+        <p:spPr/>
+        <p:txBody>
+          <a:bodyPr/>
+          <a:lstStyle/>
+          <a:p>
+            <a:r>
+              <a:rPr lang="en-US" dirty="0" smtClean="0"/>
+              <a:t>Homepage Search Bar</a:t>
+            </a:r>
+            <a:endParaRPr lang="en-US" dirty="0"/>
+          </a:p>
+        </p:txBody>
+      </p:sp>
+      <p:sp>
+        <p:nvSpPr>
+          <p:cNvPr id="3" name="Content Placeholder 2"/>
+          <p:cNvSpPr>
+            <a:spLocks noGrp="1"/>
+          </p:cNvSpPr>
+          <p:nvPr>
+            <p:ph idx="1"/>
+          </p:nvPr>
+        </p:nvSpPr>
+        <p:spPr/>
+        <p:txBody>
+          <a:bodyPr/>
+          <a:lstStyle/>
+          <a:p>
+            <a:endParaRPr lang="en-US"/>
+          </a:p>
+        </p:txBody>
+      </p:sp>
+    </p:spTree>
+    <p:extLst>
+      <p:ext uri="{BB962C8B-B14F-4D97-AF65-F5344CB8AC3E}">
+        <p14:creationId xmlns:p14="http://schemas.microsoft.com/office/powerpoint/2010/main" val="2570634580"/>
+      </p:ext>
+    </p:extLst>
+  </p:cSld>
+  <p:clrMapOvr>
+    <a:masterClrMapping/>
+  </p:clrMapOvr>
+</p:sld>
+</file>
+
+<file path=ppt/slides/slide23.xml><?xml version="1.0" encoding="utf-8"?>
+<p:sld xmlns:a="http://schemas.openxmlformats.org/drawingml/2006/main" xmlns:r="http://schemas.openxmlformats.org/officeDocument/2006/relationships" xmlns:p="http://schemas.openxmlformats.org/presentationml/2006/main">
+  <p:cSld>
+    <p:spTree>
+      <p:nvGrpSpPr>
+        <p:cNvPr id="1" name=""/>
+        <p:cNvGrpSpPr/>
+        <p:nvPr/>
+      </p:nvGrpSpPr>
+      <p:grpSpPr>
+        <a:xfrm>
+          <a:off x="0" y="0"/>
+          <a:ext cx="0" cy="0"/>
+          <a:chOff x="0" y="0"/>
+          <a:chExt cx="0" cy="0"/>
+        </a:xfrm>
+      </p:grpSpPr>
+      <p:sp>
+        <p:nvSpPr>
+          <p:cNvPr id="2" name="Title 1"/>
+          <p:cNvSpPr>
+            <a:spLocks noGrp="1"/>
+          </p:cNvSpPr>
+          <p:nvPr>
+            <p:ph type="title"/>
+          </p:nvPr>
+        </p:nvSpPr>
+        <p:spPr/>
+        <p:txBody>
+          <a:bodyPr/>
+          <a:lstStyle/>
+          <a:p>
+            <a:r>
+              <a:rPr lang="en-US" dirty="0" smtClean="0"/>
+              <a:t>Region Display Selector</a:t>
+            </a:r>
+            <a:endParaRPr lang="en-US" dirty="0"/>
+          </a:p>
+        </p:txBody>
+      </p:sp>
+      <p:pic>
+        <p:nvPicPr>
+          <p:cNvPr id="4" name="Content Placeholder 3" descr="Screen Shot 2015-04-28 at 5.07.32 PM.png"/>
+          <p:cNvPicPr>
+            <a:picLocks noGrp="1" noChangeAspect="1"/>
+          </p:cNvPicPr>
+          <p:nvPr>
+            <p:ph idx="1"/>
+          </p:nvPr>
+        </p:nvPicPr>
+        <p:blipFill>
+          <a:blip r:embed="rId3">
+            <a:extLst>
+              <a:ext uri="{28A0092B-C50C-407E-A947-70E740481C1C}">
+                <a14:useLocalDpi xmlns:a14="http://schemas.microsoft.com/office/drawing/2010/main" val="0"/>
+              </a:ext>
+            </a:extLst>
+          </a:blip>
+          <a:srcRect t="-11550" b="-11550"/>
+          <a:stretch>
+            <a:fillRect/>
+          </a:stretch>
+        </p:blipFill>
+        <p:spPr/>
+      </p:pic>
+      <p:sp>
+        <p:nvSpPr>
+          <p:cNvPr id="5" name="Donut 4"/>
+          <p:cNvSpPr/>
+          <p:nvPr/>
+        </p:nvSpPr>
+        <p:spPr>
+          <a:xfrm>
+            <a:off x="191833" y="2348910"/>
+            <a:ext cx="3448834" cy="817624"/>
+          </a:xfrm>
+          <a:prstGeom prst="donut">
+            <a:avLst>
+              <a:gd name="adj" fmla="val 7435"/>
+            </a:avLst>
+          </a:prstGeom>
+          <a:solidFill>
+            <a:schemeClr val="tx1"/>
+          </a:solidFill>
+          <a:ln>
+            <a:noFill/>
+          </a:ln>
+        </p:spPr>
+        <p:style>
+          <a:lnRef idx="1">
+            <a:schemeClr val="accent1"/>
+          </a:lnRef>
+          <a:fillRef idx="3">
+            <a:schemeClr val="accent1"/>
+          </a:fillRef>
+          <a:effectRef idx="2">
+            <a:schemeClr val="accent1"/>
+          </a:effectRef>
+          <a:fontRef idx="minor">
+            <a:schemeClr val="lt1"/>
+          </a:fontRef>
+        </p:style>
+        <p:txBody>
+          <a:bodyPr rtlCol="0" anchor="ctr"/>
+          <a:lstStyle/>
+          <a:p>
+            <a:pPr algn="ctr"/>
+            <a:endParaRPr lang="en-US">
+              <a:solidFill>
+                <a:schemeClr val="tx1"/>
+              </a:solidFill>
+            </a:endParaRPr>
+          </a:p>
+        </p:txBody>
+      </p:sp>
+    </p:spTree>
+    <p:extLst>
+      <p:ext uri="{BB962C8B-B14F-4D97-AF65-F5344CB8AC3E}">
+        <p14:creationId xmlns:p14="http://schemas.microsoft.com/office/powerpoint/2010/main" val="1303049864"/>
+      </p:ext>
+    </p:extLst>
+  </p:cSld>
+  <p:clrMapOvr>
+    <a:masterClrMapping/>
+  </p:clrMapOvr>
+</p:sld>
+</file>
+
+<file path=ppt/slides/slide24.xml><?xml version="1.0" encoding="utf-8"?>
+<p:sld xmlns:a="http://schemas.openxmlformats.org/drawingml/2006/main" xmlns:r="http://schemas.openxmlformats.org/officeDocument/2006/relationships" xmlns:p="http://schemas.openxmlformats.org/presentationml/2006/main">
+  <p:cSld>
+    <p:spTree>
+      <p:nvGrpSpPr>
+        <p:cNvPr id="1" name=""/>
+        <p:cNvGrpSpPr/>
+        <p:nvPr/>
+      </p:nvGrpSpPr>
+      <p:grpSpPr>
+        <a:xfrm>
+          <a:off x="0" y="0"/>
+          <a:ext cx="0" cy="0"/>
+          <a:chOff x="0" y="0"/>
+          <a:chExt cx="0" cy="0"/>
+        </a:xfrm>
+      </p:grpSpPr>
+      <p:sp>
+        <p:nvSpPr>
+          <p:cNvPr id="2" name="Title 1"/>
+          <p:cNvSpPr>
+            <a:spLocks noGrp="1"/>
+          </p:cNvSpPr>
+          <p:nvPr>
+            <p:ph type="title"/>
+          </p:nvPr>
+        </p:nvSpPr>
+        <p:spPr/>
+        <p:txBody>
+          <a:bodyPr/>
+          <a:lstStyle/>
+          <a:p>
+            <a:r>
+              <a:rPr lang="en-US" dirty="0" smtClean="0"/>
               <a:t>Trees</a:t>
             </a:r>
             <a:endParaRPr lang="en-US" dirty="0"/>
@@ -5002,7 +7059,7 @@
 </p:sld>
 </file>
 
-<file path=ppt/slides/slide11.xml><?xml version="1.0" encoding="utf-8"?>
+<file path=ppt/slides/slide25.xml><?xml version="1.0" encoding="utf-8"?>
 <p:sld xmlns:a="http://schemas.openxmlformats.org/drawingml/2006/main" xmlns:r="http://schemas.openxmlformats.org/officeDocument/2006/relationships" xmlns:p="http://schemas.openxmlformats.org/presentationml/2006/main">
   <p:cSld>
     <p:spTree>
@@ -5130,7 +7187,7 @@
 </p:sld>
 </file>
 
-<file path=ppt/slides/slide12.xml><?xml version="1.0" encoding="utf-8"?>
+<file path=ppt/slides/slide26.xml><?xml version="1.0" encoding="utf-8"?>
 <p:sld xmlns:a="http://schemas.openxmlformats.org/drawingml/2006/main" xmlns:r="http://schemas.openxmlformats.org/officeDocument/2006/relationships" xmlns:p="http://schemas.openxmlformats.org/presentationml/2006/main">
   <p:cSld>
     <p:spTree>
@@ -5202,7 +7259,7 @@
 </p:sld>
 </file>
 
-<file path=ppt/slides/slide13.xml><?xml version="1.0" encoding="utf-8"?>
+<file path=ppt/slides/slide27.xml><?xml version="1.0" encoding="utf-8"?>
 <p:sld xmlns:a="http://schemas.openxmlformats.org/drawingml/2006/main" xmlns:r="http://schemas.openxmlformats.org/officeDocument/2006/relationships" xmlns:p="http://schemas.openxmlformats.org/presentationml/2006/main">
   <p:cSld>
     <p:spTree>
@@ -5280,7 +7337,7 @@
 </p:sld>
 </file>
 
-<file path=ppt/slides/slide14.xml><?xml version="1.0" encoding="utf-8"?>
+<file path=ppt/slides/slide28.xml><?xml version="1.0" encoding="utf-8"?>
 <p:sld xmlns:a="http://schemas.openxmlformats.org/drawingml/2006/main" xmlns:r="http://schemas.openxmlformats.org/officeDocument/2006/relationships" xmlns:p="http://schemas.openxmlformats.org/presentationml/2006/main">
   <p:cSld>
     <p:spTree>
@@ -5354,7 +7411,7 @@
 </p:sld>
 </file>
 
-<file path=ppt/slides/slide15.xml><?xml version="1.0" encoding="utf-8"?>
+<file path=ppt/slides/slide29.xml><?xml version="1.0" encoding="utf-8"?>
 <p:sld xmlns:a="http://schemas.openxmlformats.org/drawingml/2006/main" xmlns:r="http://schemas.openxmlformats.org/officeDocument/2006/relationships" xmlns:p="http://schemas.openxmlformats.org/presentationml/2006/main">
   <p:cSld>
     <p:spTree>
@@ -5426,222 +7483,6 @@
     <p:extLst>
       <p:ext uri="{BB962C8B-B14F-4D97-AF65-F5344CB8AC3E}">
         <p14:creationId xmlns:p14="http://schemas.microsoft.com/office/powerpoint/2010/main" val="2467847482"/>
-      </p:ext>
-    </p:extLst>
-  </p:cSld>
-  <p:clrMapOvr>
-    <a:masterClrMapping/>
-  </p:clrMapOvr>
-</p:sld>
-</file>
-
-<file path=ppt/slides/slide16.xml><?xml version="1.0" encoding="utf-8"?>
-<p:sld xmlns:a="http://schemas.openxmlformats.org/drawingml/2006/main" xmlns:r="http://schemas.openxmlformats.org/officeDocument/2006/relationships" xmlns:p="http://schemas.openxmlformats.org/presentationml/2006/main">
-  <p:cSld>
-    <p:spTree>
-      <p:nvGrpSpPr>
-        <p:cNvPr id="1" name=""/>
-        <p:cNvGrpSpPr/>
-        <p:nvPr/>
-      </p:nvGrpSpPr>
-      <p:grpSpPr>
-        <a:xfrm>
-          <a:off x="0" y="0"/>
-          <a:ext cx="0" cy="0"/>
-          <a:chOff x="0" y="0"/>
-          <a:chExt cx="0" cy="0"/>
-        </a:xfrm>
-      </p:grpSpPr>
-      <p:sp>
-        <p:nvSpPr>
-          <p:cNvPr id="2" name="Title 1"/>
-          <p:cNvSpPr>
-            <a:spLocks noGrp="1"/>
-          </p:cNvSpPr>
-          <p:nvPr>
-            <p:ph type="title"/>
-          </p:nvPr>
-        </p:nvSpPr>
-        <p:spPr/>
-        <p:txBody>
-          <a:bodyPr/>
-          <a:lstStyle/>
-          <a:p>
-            <a:r>
-              <a:rPr lang="en-US" dirty="0" smtClean="0"/>
-              <a:t>Charts</a:t>
-            </a:r>
-            <a:endParaRPr lang="en-US" dirty="0"/>
-          </a:p>
-        </p:txBody>
-      </p:sp>
-      <p:sp>
-        <p:nvSpPr>
-          <p:cNvPr id="3" name="Content Placeholder 2"/>
-          <p:cNvSpPr>
-            <a:spLocks noGrp="1"/>
-          </p:cNvSpPr>
-          <p:nvPr>
-            <p:ph idx="1"/>
-          </p:nvPr>
-        </p:nvSpPr>
-        <p:spPr/>
-        <p:txBody>
-          <a:bodyPr/>
-          <a:lstStyle/>
-          <a:p>
-            <a:endParaRPr lang="en-US" dirty="0"/>
-          </a:p>
-        </p:txBody>
-      </p:sp>
-    </p:spTree>
-    <p:extLst>
-      <p:ext uri="{BB962C8B-B14F-4D97-AF65-F5344CB8AC3E}">
-        <p14:creationId xmlns:p14="http://schemas.microsoft.com/office/powerpoint/2010/main" val="2659698781"/>
-      </p:ext>
-    </p:extLst>
-  </p:cSld>
-  <p:clrMapOvr>
-    <a:masterClrMapping/>
-  </p:clrMapOvr>
-</p:sld>
-</file>
-
-<file path=ppt/slides/slide17.xml><?xml version="1.0" encoding="utf-8"?>
-<p:sld xmlns:a="http://schemas.openxmlformats.org/drawingml/2006/main" xmlns:r="http://schemas.openxmlformats.org/officeDocument/2006/relationships" xmlns:p="http://schemas.openxmlformats.org/presentationml/2006/main">
-  <p:cSld>
-    <p:spTree>
-      <p:nvGrpSpPr>
-        <p:cNvPr id="1" name=""/>
-        <p:cNvGrpSpPr/>
-        <p:nvPr/>
-      </p:nvGrpSpPr>
-      <p:grpSpPr>
-        <a:xfrm>
-          <a:off x="0" y="0"/>
-          <a:ext cx="0" cy="0"/>
-          <a:chOff x="0" y="0"/>
-          <a:chExt cx="0" cy="0"/>
-        </a:xfrm>
-      </p:grpSpPr>
-      <p:sp>
-        <p:nvSpPr>
-          <p:cNvPr id="2" name="Title 1"/>
-          <p:cNvSpPr>
-            <a:spLocks noGrp="1"/>
-          </p:cNvSpPr>
-          <p:nvPr>
-            <p:ph type="title"/>
-          </p:nvPr>
-        </p:nvSpPr>
-        <p:spPr/>
-        <p:txBody>
-          <a:bodyPr/>
-          <a:lstStyle/>
-          <a:p>
-            <a:r>
-              <a:rPr lang="en-US" dirty="0" smtClean="0"/>
-              <a:t>Authorization Schemes</a:t>
-            </a:r>
-            <a:endParaRPr lang="en-US" dirty="0"/>
-          </a:p>
-        </p:txBody>
-      </p:sp>
-      <p:sp>
-        <p:nvSpPr>
-          <p:cNvPr id="3" name="Content Placeholder 2"/>
-          <p:cNvSpPr>
-            <a:spLocks noGrp="1"/>
-          </p:cNvSpPr>
-          <p:nvPr>
-            <p:ph idx="1"/>
-          </p:nvPr>
-        </p:nvSpPr>
-        <p:spPr/>
-        <p:txBody>
-          <a:bodyPr/>
-          <a:lstStyle/>
-          <a:p>
-            <a:endParaRPr lang="en-US"/>
-          </a:p>
-        </p:txBody>
-      </p:sp>
-    </p:spTree>
-    <p:extLst>
-      <p:ext uri="{BB962C8B-B14F-4D97-AF65-F5344CB8AC3E}">
-        <p14:creationId xmlns:p14="http://schemas.microsoft.com/office/powerpoint/2010/main" val="980145272"/>
-      </p:ext>
-    </p:extLst>
-  </p:cSld>
-  <p:clrMapOvr>
-    <a:masterClrMapping/>
-  </p:clrMapOvr>
-</p:sld>
-</file>
-
-<file path=ppt/slides/slide2.xml><?xml version="1.0" encoding="utf-8"?>
-<p:sld xmlns:a="http://schemas.openxmlformats.org/drawingml/2006/main" xmlns:r="http://schemas.openxmlformats.org/officeDocument/2006/relationships" xmlns:p="http://schemas.openxmlformats.org/presentationml/2006/main">
-  <p:cSld>
-    <p:spTree>
-      <p:nvGrpSpPr>
-        <p:cNvPr id="1" name=""/>
-        <p:cNvGrpSpPr/>
-        <p:nvPr/>
-      </p:nvGrpSpPr>
-      <p:grpSpPr>
-        <a:xfrm>
-          <a:off x="0" y="0"/>
-          <a:ext cx="0" cy="0"/>
-          <a:chOff x="0" y="0"/>
-          <a:chExt cx="0" cy="0"/>
-        </a:xfrm>
-      </p:grpSpPr>
-      <p:sp>
-        <p:nvSpPr>
-          <p:cNvPr id="2" name="Title 1"/>
-          <p:cNvSpPr>
-            <a:spLocks noGrp="1"/>
-          </p:cNvSpPr>
-          <p:nvPr>
-            <p:ph type="title"/>
-          </p:nvPr>
-        </p:nvSpPr>
-        <p:spPr/>
-        <p:txBody>
-          <a:bodyPr/>
-          <a:lstStyle/>
-          <a:p>
-            <a:r>
-              <a:rPr lang="en-US" dirty="0" smtClean="0"/>
-              <a:t>Conceptual Model</a:t>
-            </a:r>
-            <a:endParaRPr lang="en-US" dirty="0"/>
-          </a:p>
-        </p:txBody>
-      </p:sp>
-      <p:sp>
-        <p:nvSpPr>
-          <p:cNvPr id="3" name="Content Placeholder 2"/>
-          <p:cNvSpPr>
-            <a:spLocks noGrp="1"/>
-          </p:cNvSpPr>
-          <p:nvPr>
-            <p:ph idx="1"/>
-          </p:nvPr>
-        </p:nvSpPr>
-        <p:spPr/>
-        <p:txBody>
-          <a:bodyPr/>
-          <a:lstStyle/>
-          <a:p>
-            <a:endParaRPr lang="en-US" dirty="0"/>
-          </a:p>
-        </p:txBody>
-      </p:sp>
-    </p:spTree>
-    <p:extLst>
-      <p:ext uri="{BB962C8B-B14F-4D97-AF65-F5344CB8AC3E}">
-        <p14:creationId xmlns:p14="http://schemas.microsoft.com/office/powerpoint/2010/main" val="1705706920"/>
       </p:ext>
     </p:extLst>
   </p:cSld>
@@ -5723,6 +7564,150 @@
 </p:sld>
 </file>
 
+<file path=ppt/slides/slide30.xml><?xml version="1.0" encoding="utf-8"?>
+<p:sld xmlns:a="http://schemas.openxmlformats.org/drawingml/2006/main" xmlns:r="http://schemas.openxmlformats.org/officeDocument/2006/relationships" xmlns:p="http://schemas.openxmlformats.org/presentationml/2006/main">
+  <p:cSld>
+    <p:spTree>
+      <p:nvGrpSpPr>
+        <p:cNvPr id="1" name=""/>
+        <p:cNvGrpSpPr/>
+        <p:nvPr/>
+      </p:nvGrpSpPr>
+      <p:grpSpPr>
+        <a:xfrm>
+          <a:off x="0" y="0"/>
+          <a:ext cx="0" cy="0"/>
+          <a:chOff x="0" y="0"/>
+          <a:chExt cx="0" cy="0"/>
+        </a:xfrm>
+      </p:grpSpPr>
+      <p:sp>
+        <p:nvSpPr>
+          <p:cNvPr id="2" name="Title 1"/>
+          <p:cNvSpPr>
+            <a:spLocks noGrp="1"/>
+          </p:cNvSpPr>
+          <p:nvPr>
+            <p:ph type="title"/>
+          </p:nvPr>
+        </p:nvSpPr>
+        <p:spPr/>
+        <p:txBody>
+          <a:bodyPr/>
+          <a:lstStyle/>
+          <a:p>
+            <a:r>
+              <a:rPr lang="en-US" dirty="0" smtClean="0"/>
+              <a:t>Charts</a:t>
+            </a:r>
+            <a:endParaRPr lang="en-US" dirty="0"/>
+          </a:p>
+        </p:txBody>
+      </p:sp>
+      <p:sp>
+        <p:nvSpPr>
+          <p:cNvPr id="3" name="Content Placeholder 2"/>
+          <p:cNvSpPr>
+            <a:spLocks noGrp="1"/>
+          </p:cNvSpPr>
+          <p:nvPr>
+            <p:ph idx="1"/>
+          </p:nvPr>
+        </p:nvSpPr>
+        <p:spPr/>
+        <p:txBody>
+          <a:bodyPr/>
+          <a:lstStyle/>
+          <a:p>
+            <a:endParaRPr lang="en-US" dirty="0"/>
+          </a:p>
+        </p:txBody>
+      </p:sp>
+    </p:spTree>
+    <p:extLst>
+      <p:ext uri="{BB962C8B-B14F-4D97-AF65-F5344CB8AC3E}">
+        <p14:creationId xmlns:p14="http://schemas.microsoft.com/office/powerpoint/2010/main" val="2659698781"/>
+      </p:ext>
+    </p:extLst>
+  </p:cSld>
+  <p:clrMapOvr>
+    <a:masterClrMapping/>
+  </p:clrMapOvr>
+</p:sld>
+</file>
+
+<file path=ppt/slides/slide31.xml><?xml version="1.0" encoding="utf-8"?>
+<p:sld xmlns:a="http://schemas.openxmlformats.org/drawingml/2006/main" xmlns:r="http://schemas.openxmlformats.org/officeDocument/2006/relationships" xmlns:p="http://schemas.openxmlformats.org/presentationml/2006/main">
+  <p:cSld>
+    <p:spTree>
+      <p:nvGrpSpPr>
+        <p:cNvPr id="1" name=""/>
+        <p:cNvGrpSpPr/>
+        <p:nvPr/>
+      </p:nvGrpSpPr>
+      <p:grpSpPr>
+        <a:xfrm>
+          <a:off x="0" y="0"/>
+          <a:ext cx="0" cy="0"/>
+          <a:chOff x="0" y="0"/>
+          <a:chExt cx="0" cy="0"/>
+        </a:xfrm>
+      </p:grpSpPr>
+      <p:sp>
+        <p:nvSpPr>
+          <p:cNvPr id="2" name="Title 1"/>
+          <p:cNvSpPr>
+            <a:spLocks noGrp="1"/>
+          </p:cNvSpPr>
+          <p:nvPr>
+            <p:ph type="title"/>
+          </p:nvPr>
+        </p:nvSpPr>
+        <p:spPr/>
+        <p:txBody>
+          <a:bodyPr/>
+          <a:lstStyle/>
+          <a:p>
+            <a:r>
+              <a:rPr lang="en-US" dirty="0" smtClean="0"/>
+              <a:t>Authorization Schemes</a:t>
+            </a:r>
+            <a:endParaRPr lang="en-US" dirty="0"/>
+          </a:p>
+        </p:txBody>
+      </p:sp>
+      <p:sp>
+        <p:nvSpPr>
+          <p:cNvPr id="3" name="Content Placeholder 2"/>
+          <p:cNvSpPr>
+            <a:spLocks noGrp="1"/>
+          </p:cNvSpPr>
+          <p:nvPr>
+            <p:ph idx="1"/>
+          </p:nvPr>
+        </p:nvSpPr>
+        <p:spPr/>
+        <p:txBody>
+          <a:bodyPr/>
+          <a:lstStyle/>
+          <a:p>
+            <a:endParaRPr lang="en-US"/>
+          </a:p>
+        </p:txBody>
+      </p:sp>
+    </p:spTree>
+    <p:extLst>
+      <p:ext uri="{BB962C8B-B14F-4D97-AF65-F5344CB8AC3E}">
+        <p14:creationId xmlns:p14="http://schemas.microsoft.com/office/powerpoint/2010/main" val="980145272"/>
+      </p:ext>
+    </p:extLst>
+  </p:cSld>
+  <p:clrMapOvr>
+    <a:masterClrMapping/>
+  </p:clrMapOvr>
+</p:sld>
+</file>
+
 <file path=ppt/slides/slide4.xml><?xml version="1.0" encoding="utf-8"?>
 <p:sld xmlns:a="http://schemas.openxmlformats.org/drawingml/2006/main" xmlns:r="http://schemas.openxmlformats.org/officeDocument/2006/relationships" xmlns:p="http://schemas.openxmlformats.org/presentationml/2006/main">
   <p:cSld>
@@ -5757,7 +7742,11 @@
           <a:p>
             <a:r>
               <a:rPr lang="en-US" dirty="0" smtClean="0"/>
-              <a:t>Must Have Features</a:t>
+              <a:t>General List </a:t>
+            </a:r>
+            <a:r>
+              <a:rPr lang="en-US" dirty="0" err="1" smtClean="0"/>
+              <a:t>Matience</a:t>
             </a:r>
             <a:endParaRPr lang="en-US" dirty="0"/>
           </a:p>
@@ -5780,69 +7769,30 @@
           <a:p>
             <a:r>
               <a:rPr lang="en-US" dirty="0" smtClean="0"/>
-              <a:t>Report Downloads</a:t>
+              <a:t>Authorization scheme to restrict access (admin/standard)</a:t>
             </a:r>
           </a:p>
           <a:p>
             <a:r>
               <a:rPr lang="en-US" dirty="0" smtClean="0"/>
-              <a:t>Data Loading</a:t>
-            </a:r>
-          </a:p>
-          <a:p>
-            <a:r>
-              <a:rPr lang="en-US" dirty="0" smtClean="0"/>
-              <a:t>Document Uploads</a:t>
-            </a:r>
-          </a:p>
-          <a:p>
-            <a:r>
-              <a:rPr lang="en-US" dirty="0" smtClean="0"/>
-              <a:t>Homepage Search Bar</a:t>
-            </a:r>
-          </a:p>
-          <a:p>
-            <a:r>
-              <a:rPr lang="en-US" dirty="0" smtClean="0"/>
-              <a:t>Region Display Selector</a:t>
-            </a:r>
-          </a:p>
-          <a:p>
-            <a:r>
-              <a:rPr lang="en-US" dirty="0" smtClean="0"/>
-              <a:t>Trees</a:t>
-            </a:r>
-          </a:p>
-          <a:p>
-            <a:r>
-              <a:rPr lang="en-US" dirty="0" smtClean="0"/>
-              <a:t>Shortcut</a:t>
-            </a:r>
-          </a:p>
-          <a:p>
-            <a:r>
-              <a:rPr lang="en-US" dirty="0" smtClean="0"/>
-              <a:t>Shuttle</a:t>
-            </a:r>
-          </a:p>
-          <a:p>
-            <a:r>
-              <a:rPr lang="en-US" dirty="0" smtClean="0"/>
-              <a:t>Group Select List</a:t>
-            </a:r>
-          </a:p>
-          <a:p>
-            <a:r>
-              <a:rPr lang="en-US" dirty="0" smtClean="0"/>
-              <a:t>Modal Branching</a:t>
-            </a:r>
+              <a:t>Trigger for creating lists</a:t>
+            </a:r>
+          </a:p>
+          <a:p>
+            <a:pPr marL="0" indent="0">
+              <a:buNone/>
+            </a:pPr>
+            <a:endParaRPr lang="en-US" dirty="0" smtClean="0"/>
+          </a:p>
+          <a:p>
+            <a:endParaRPr lang="en-US" dirty="0"/>
           </a:p>
         </p:txBody>
       </p:sp>
     </p:spTree>
     <p:extLst>
       <p:ext uri="{BB962C8B-B14F-4D97-AF65-F5344CB8AC3E}">
-        <p14:creationId xmlns:p14="http://schemas.microsoft.com/office/powerpoint/2010/main" val="34625199"/>
+        <p14:creationId xmlns:p14="http://schemas.microsoft.com/office/powerpoint/2010/main" val="4253833504"/>
       </p:ext>
     </p:extLst>
   </p:cSld>
@@ -5886,184 +7836,101 @@
           <a:p>
             <a:r>
               <a:rPr lang="en-US" dirty="0" smtClean="0"/>
-              <a:t>Report Downloads</a:t>
+              <a:t>Authorization Scheme</a:t>
             </a:r>
             <a:endParaRPr lang="en-US" dirty="0"/>
           </a:p>
         </p:txBody>
       </p:sp>
-      <p:pic>
-        <p:nvPicPr>
-          <p:cNvPr id="4" name="Content Placeholder 3" descr="Screen Shot 2015-04-28 at 5.07.32 PM.png"/>
-          <p:cNvPicPr>
-            <a:picLocks noGrp="1" noChangeAspect="1"/>
-          </p:cNvPicPr>
+      <p:sp>
+        <p:nvSpPr>
+          <p:cNvPr id="3" name="Content Placeholder 2"/>
+          <p:cNvSpPr>
+            <a:spLocks noGrp="1"/>
+          </p:cNvSpPr>
           <p:nvPr>
             <p:ph idx="1"/>
           </p:nvPr>
-        </p:nvPicPr>
-        <p:blipFill>
-          <a:blip r:embed="rId3">
-            <a:extLst>
-              <a:ext uri="{28A0092B-C50C-407E-A947-70E740481C1C}">
-                <a14:useLocalDpi xmlns:a14="http://schemas.microsoft.com/office/drawing/2010/main" val="0"/>
-              </a:ext>
-            </a:extLst>
-          </a:blip>
-          <a:srcRect t="-11550" b="-11550"/>
-          <a:stretch>
-            <a:fillRect/>
-          </a:stretch>
-        </p:blipFill>
-        <p:spPr/>
-      </p:pic>
-      <p:sp>
-        <p:nvSpPr>
-          <p:cNvPr id="5" name="Donut 4"/>
-          <p:cNvSpPr/>
-          <p:nvPr/>
-        </p:nvSpPr>
-        <p:spPr>
-          <a:xfrm>
-            <a:off x="6626500" y="1725693"/>
-            <a:ext cx="1888634" cy="1009367"/>
-          </a:xfrm>
-          <a:prstGeom prst="donut">
-            <a:avLst>
-              <a:gd name="adj" fmla="val 7435"/>
-            </a:avLst>
-          </a:prstGeom>
-          <a:solidFill>
-            <a:schemeClr val="tx1"/>
-          </a:solidFill>
-          <a:ln>
-            <a:noFill/>
-          </a:ln>
-        </p:spPr>
-        <p:style>
-          <a:lnRef idx="1">
-            <a:schemeClr val="accent1"/>
-          </a:lnRef>
-          <a:fillRef idx="3">
-            <a:schemeClr val="accent1"/>
-          </a:fillRef>
-          <a:effectRef idx="2">
-            <a:schemeClr val="accent1"/>
-          </a:effectRef>
-          <a:fontRef idx="minor">
-            <a:schemeClr val="lt1"/>
-          </a:fontRef>
-        </p:style>
-        <p:txBody>
-          <a:bodyPr rtlCol="0" anchor="ctr"/>
-          <a:lstStyle/>
-          <a:p>
-            <a:pPr algn="ctr"/>
-            <a:endParaRPr lang="en-US">
-              <a:solidFill>
-                <a:schemeClr val="tx1"/>
-              </a:solidFill>
-            </a:endParaRPr>
-          </a:p>
-        </p:txBody>
-      </p:sp>
-      <p:pic>
-        <p:nvPicPr>
-          <p:cNvPr id="6" name="Picture 5" descr="Screen Shot 2015-04-28 at 5.11.24 PM.png"/>
-          <p:cNvPicPr>
-            <a:picLocks noChangeAspect="1"/>
-          </p:cNvPicPr>
-          <p:nvPr/>
-        </p:nvPicPr>
-        <p:blipFill>
-          <a:blip r:embed="rId4">
-            <a:extLst>
-              <a:ext uri="{28A0092B-C50C-407E-A947-70E740481C1C}">
-                <a14:useLocalDpi xmlns:a14="http://schemas.microsoft.com/office/drawing/2010/main" val="0"/>
-              </a:ext>
-            </a:extLst>
-          </a:blip>
-          <a:stretch>
-            <a:fillRect/>
-          </a:stretch>
-        </p:blipFill>
-        <p:spPr>
-          <a:xfrm>
-            <a:off x="3210200" y="3483568"/>
-            <a:ext cx="3416300" cy="2222500"/>
-          </a:xfrm>
-          <a:prstGeom prst="rect">
-            <a:avLst/>
-          </a:prstGeom>
-          <a:ln>
-            <a:noFill/>
-          </a:ln>
-          <a:effectLst>
-            <a:outerShdw blurRad="292100" dist="139700" dir="2700000" algn="tl" rotWithShape="0">
-              <a:srgbClr val="333333">
-                <a:alpha val="65000"/>
-              </a:srgbClr>
-            </a:outerShdw>
-          </a:effectLst>
-        </p:spPr>
-      </p:pic>
-      <p:sp>
-        <p:nvSpPr>
-          <p:cNvPr id="11" name="Bent Arrow 10"/>
-          <p:cNvSpPr/>
-          <p:nvPr/>
-        </p:nvSpPr>
-        <p:spPr>
-          <a:xfrm rot="9874580">
-            <a:off x="6382280" y="3076941"/>
-            <a:ext cx="1693258" cy="1204729"/>
-          </a:xfrm>
-          <a:prstGeom prst="bentArrow">
-            <a:avLst>
-              <a:gd name="adj1" fmla="val 6719"/>
-              <a:gd name="adj2" fmla="val 21774"/>
-              <a:gd name="adj3" fmla="val 20699"/>
-              <a:gd name="adj4" fmla="val 70633"/>
-            </a:avLst>
-          </a:prstGeom>
-          <a:solidFill>
-            <a:srgbClr val="292934"/>
-          </a:solidFill>
-          <a:ln>
-            <a:noFill/>
-          </a:ln>
-        </p:spPr>
-        <p:style>
-          <a:lnRef idx="1">
-            <a:schemeClr val="accent1"/>
-          </a:lnRef>
-          <a:fillRef idx="3">
-            <a:schemeClr val="accent1"/>
-          </a:fillRef>
-          <a:effectRef idx="2">
-            <a:schemeClr val="accent1"/>
-          </a:effectRef>
-          <a:fontRef idx="minor">
-            <a:schemeClr val="lt1"/>
-          </a:fontRef>
-        </p:style>
-        <p:txBody>
-          <a:bodyPr rtlCol="0" anchor="ctr"/>
-          <a:lstStyle/>
-          <a:p>
-            <a:pPr algn="ctr"/>
-            <a:endParaRPr lang="en-US">
-              <a:solidFill>
-                <a:schemeClr val="tx1"/>
-              </a:solidFill>
-            </a:endParaRPr>
+        </p:nvSpPr>
+        <p:spPr/>
+        <p:txBody>
+          <a:bodyPr/>
+          <a:lstStyle/>
+          <a:p>
+            <a:r>
+              <a:rPr lang="en-US" dirty="0" smtClean="0"/>
+              <a:t>User specifies self at login </a:t>
+            </a:r>
+          </a:p>
+          <a:p>
+            <a:pPr marL="0" indent="0">
+              <a:buNone/>
+            </a:pPr>
+            <a:r>
+              <a:rPr lang="en-US" dirty="0"/>
+              <a:t>	</a:t>
+            </a:r>
+            <a:r>
+              <a:rPr lang="en-US" dirty="0" smtClean="0"/>
+              <a:t>- Determines Admin/Standard</a:t>
+            </a:r>
+          </a:p>
+          <a:p>
+            <a:r>
+              <a:rPr lang="en-US" dirty="0"/>
+              <a:t>Admin:</a:t>
+            </a:r>
+          </a:p>
+          <a:p>
+            <a:pPr marL="274320" lvl="1" indent="0">
+              <a:buNone/>
+            </a:pPr>
+            <a:r>
+              <a:rPr lang="en-US" dirty="0"/>
+              <a:t>	See all lists, create lists, edit privileges on specified fields</a:t>
+            </a:r>
+          </a:p>
+          <a:p>
+            <a:pPr marL="0" indent="0">
+              <a:buNone/>
+            </a:pPr>
+            <a:endParaRPr lang="en-US" dirty="0" smtClean="0"/>
+          </a:p>
+          <a:p>
+            <a:r>
+              <a:rPr lang="en-US" dirty="0" smtClean="0"/>
+              <a:t>Standard:</a:t>
+            </a:r>
+          </a:p>
+          <a:p>
+            <a:pPr marL="274320" lvl="1" indent="0">
+              <a:buNone/>
+            </a:pPr>
+            <a:r>
+              <a:rPr lang="en-US" dirty="0"/>
+              <a:t>	</a:t>
+            </a:r>
+            <a:r>
+              <a:rPr lang="en-US" dirty="0" smtClean="0"/>
+              <a:t>See lists in their division, no edit/create privileges </a:t>
+            </a:r>
+          </a:p>
+          <a:p>
+            <a:pPr marL="274320" lvl="1" indent="0">
+              <a:buNone/>
+            </a:pPr>
+            <a:r>
+              <a:rPr lang="en-US" dirty="0"/>
+              <a:t>	</a:t>
+            </a:r>
+            <a:endParaRPr lang="en-US" dirty="0" smtClean="0"/>
           </a:p>
         </p:txBody>
       </p:sp>
     </p:spTree>
     <p:extLst>
       <p:ext uri="{BB962C8B-B14F-4D97-AF65-F5344CB8AC3E}">
-        <p14:creationId xmlns:p14="http://schemas.microsoft.com/office/powerpoint/2010/main" val="370475556"/>
+        <p14:creationId xmlns:p14="http://schemas.microsoft.com/office/powerpoint/2010/main" val="3435890285"/>
       </p:ext>
     </p:extLst>
   </p:cSld>
@@ -6107,41 +7974,118 @@
           <a:p>
             <a:r>
               <a:rPr lang="en-US" dirty="0" smtClean="0"/>
-              <a:t>Data Loading</a:t>
+              <a:t>Trigger For Creating Lists</a:t>
             </a:r>
             <a:endParaRPr lang="en-US" dirty="0"/>
           </a:p>
         </p:txBody>
       </p:sp>
-      <p:pic>
-        <p:nvPicPr>
-          <p:cNvPr id="4" name="Content Placeholder 3" descr="Screen Shot 2015-04-28 at 5.16.21 PM.png"/>
-          <p:cNvPicPr>
-            <a:picLocks noGrp="1" noChangeAspect="1"/>
-          </p:cNvPicPr>
+      <p:sp>
+        <p:nvSpPr>
+          <p:cNvPr id="3" name="Content Placeholder 2"/>
+          <p:cNvSpPr>
+            <a:spLocks noGrp="1"/>
+          </p:cNvSpPr>
           <p:nvPr>
             <p:ph idx="1"/>
           </p:nvPr>
-        </p:nvPicPr>
-        <p:blipFill>
-          <a:blip r:embed="rId3">
-            <a:extLst>
-              <a:ext uri="{28A0092B-C50C-407E-A947-70E740481C1C}">
-                <a14:useLocalDpi xmlns:a14="http://schemas.microsoft.com/office/drawing/2010/main" val="0"/>
-              </a:ext>
-            </a:extLst>
-          </a:blip>
-          <a:srcRect l="-11238" r="-11238"/>
-          <a:stretch>
-            <a:fillRect/>
-          </a:stretch>
-        </p:blipFill>
-        <p:spPr/>
-      </p:pic>
+        </p:nvSpPr>
+        <p:spPr/>
+        <p:txBody>
+          <a:bodyPr/>
+          <a:lstStyle/>
+          <a:p>
+            <a:r>
+              <a:rPr lang="en-US" dirty="0" smtClean="0"/>
+              <a:t>Automatically assigns:</a:t>
+            </a:r>
+          </a:p>
+          <a:p>
+            <a:pPr marL="0" indent="0">
+              <a:buNone/>
+            </a:pPr>
+            <a:r>
+              <a:rPr lang="en-US" dirty="0" smtClean="0"/>
+              <a:t>	- Id</a:t>
+            </a:r>
+          </a:p>
+          <a:p>
+            <a:pPr marL="0" indent="0">
+              <a:buNone/>
+            </a:pPr>
+            <a:r>
+              <a:rPr lang="en-US" dirty="0"/>
+              <a:t>	</a:t>
+            </a:r>
+            <a:r>
+              <a:rPr lang="en-US" dirty="0" smtClean="0"/>
+              <a:t>- Status</a:t>
+            </a:r>
+          </a:p>
+          <a:p>
+            <a:pPr marL="0" indent="0">
+              <a:buNone/>
+            </a:pPr>
+            <a:r>
+              <a:rPr lang="en-US" dirty="0"/>
+              <a:t>	</a:t>
+            </a:r>
+            <a:r>
+              <a:rPr lang="en-US" dirty="0" smtClean="0"/>
+              <a:t>- </a:t>
+            </a:r>
+            <a:r>
+              <a:rPr lang="en-US" dirty="0" err="1" smtClean="0"/>
+              <a:t>Create_Date</a:t>
+            </a:r>
+            <a:endParaRPr lang="en-US" dirty="0" smtClean="0"/>
+          </a:p>
+          <a:p>
+            <a:pPr marL="0" indent="0">
+              <a:buNone/>
+            </a:pPr>
+            <a:r>
+              <a:rPr lang="en-US" dirty="0"/>
+              <a:t>	</a:t>
+            </a:r>
+            <a:r>
+              <a:rPr lang="en-US" dirty="0" smtClean="0"/>
+              <a:t>- </a:t>
+            </a:r>
+            <a:r>
+              <a:rPr lang="en-US" dirty="0" err="1" smtClean="0"/>
+              <a:t>Status_Effective_Date</a:t>
+            </a:r>
+            <a:endParaRPr lang="en-US" dirty="0" smtClean="0"/>
+          </a:p>
+          <a:p>
+            <a:pPr marL="0" indent="0">
+              <a:buNone/>
+            </a:pPr>
+            <a:r>
+              <a:rPr lang="en-US" dirty="0"/>
+              <a:t>	</a:t>
+            </a:r>
+            <a:r>
+              <a:rPr lang="en-US" dirty="0" smtClean="0"/>
+              <a:t>- </a:t>
+            </a:r>
+            <a:r>
+              <a:rPr lang="en-US" dirty="0" err="1" smtClean="0"/>
+              <a:t>Ownership_Division_Code</a:t>
+            </a:r>
+            <a:r>
+              <a:rPr lang="en-US" dirty="0" smtClean="0"/>
+              <a:t> (maybe)</a:t>
+            </a:r>
+            <a:endParaRPr lang="en-US" dirty="0"/>
+          </a:p>
+        </p:txBody>
+      </p:sp>
     </p:spTree>
     <p:extLst>
       <p:ext uri="{BB962C8B-B14F-4D97-AF65-F5344CB8AC3E}">
-        <p14:creationId xmlns:p14="http://schemas.microsoft.com/office/powerpoint/2010/main" val="318661808"/>
+        <p14:creationId xmlns:p14="http://schemas.microsoft.com/office/powerpoint/2010/main" val="539703018"/>
       </p:ext>
     </p:extLst>
   </p:cSld>
@@ -6185,7 +8129,7 @@
           <a:p>
             <a:r>
               <a:rPr lang="en-US" dirty="0" smtClean="0"/>
-              <a:t>Document Uploads</a:t>
+              <a:t>Login</a:t>
             </a:r>
             <a:endParaRPr lang="en-US" dirty="0"/>
           </a:p>
@@ -6201,19 +8145,88 @@
             <p:ph idx="1"/>
           </p:nvPr>
         </p:nvSpPr>
-        <p:spPr/>
-        <p:txBody>
-          <a:bodyPr/>
-          <a:lstStyle/>
-          <a:p>
-            <a:endParaRPr lang="en-US"/>
-          </a:p>
-        </p:txBody>
-      </p:sp>
+        <p:spPr>
+          <a:xfrm>
+            <a:off x="457200" y="4365938"/>
+            <a:ext cx="8229600" cy="2111062"/>
+          </a:xfrm>
+        </p:spPr>
+        <p:txBody>
+          <a:bodyPr/>
+          <a:lstStyle/>
+          <a:p>
+            <a:r>
+              <a:rPr lang="en-US" dirty="0" smtClean="0"/>
+              <a:t>Admin User</a:t>
+            </a:r>
+          </a:p>
+          <a:p>
+            <a:r>
+              <a:rPr lang="en-US" dirty="0" smtClean="0"/>
+              <a:t>Standard User</a:t>
+            </a:r>
+            <a:endParaRPr lang="en-US" dirty="0"/>
+          </a:p>
+        </p:txBody>
+      </p:sp>
+      <p:pic>
+        <p:nvPicPr>
+          <p:cNvPr id="1026" name="Picture 2"/>
+          <p:cNvPicPr>
+            <a:picLocks noChangeAspect="1" noChangeArrowheads="1"/>
+          </p:cNvPicPr>
+          <p:nvPr/>
+        </p:nvPicPr>
+        <p:blipFill>
+          <a:blip r:embed="rId2">
+            <a:extLst>
+              <a:ext uri="{28A0092B-C50C-407E-A947-70E740481C1C}">
+                <a14:useLocalDpi xmlns:a14="http://schemas.microsoft.com/office/drawing/2010/main" val="0"/>
+              </a:ext>
+            </a:extLst>
+          </a:blip>
+          <a:srcRect/>
+          <a:stretch>
+            <a:fillRect/>
+          </a:stretch>
+        </p:blipFill>
+        <p:spPr bwMode="auto">
+          <a:xfrm>
+            <a:off x="1487510" y="1845972"/>
+            <a:ext cx="5791200" cy="2038350"/>
+          </a:xfrm>
+          <a:prstGeom prst="rect">
+            <a:avLst/>
+          </a:prstGeom>
+          <a:noFill/>
+          <a:ln>
+            <a:noFill/>
+          </a:ln>
+          <a:extLst>
+            <a:ext uri="{909E8E84-426E-40DD-AFC4-6F175D3DCCD1}">
+              <a14:hiddenFill xmlns:a14="http://schemas.microsoft.com/office/drawing/2010/main">
+                <a:solidFill>
+                  <a:schemeClr val="accent1"/>
+                </a:solidFill>
+              </a14:hiddenFill>
+            </a:ext>
+            <a:ext uri="{91240B29-F687-4F45-9708-019B960494DF}">
+              <a14:hiddenLine xmlns:a14="http://schemas.microsoft.com/office/drawing/2010/main" w="9525">
+                <a:solidFill>
+                  <a:schemeClr val="tx1"/>
+                </a:solidFill>
+                <a:miter lim="800000"/>
+                <a:headEnd/>
+                <a:tailEnd/>
+              </a14:hiddenLine>
+            </a:ext>
+          </a:extLst>
+        </p:spPr>
+      </p:pic>
     </p:spTree>
     <p:extLst>
       <p:ext uri="{BB962C8B-B14F-4D97-AF65-F5344CB8AC3E}">
-        <p14:creationId xmlns:p14="http://schemas.microsoft.com/office/powerpoint/2010/main" val="2786563422"/>
+        <p14:creationId xmlns:p14="http://schemas.microsoft.com/office/powerpoint/2010/main" val="2820358028"/>
       </p:ext>
     </p:extLst>
   </p:cSld>
@@ -6257,35 +8270,178 @@
           <a:p>
             <a:r>
               <a:rPr lang="en-US" dirty="0" smtClean="0"/>
-              <a:t>Homepage Search Bar</a:t>
+              <a:t>Admin User</a:t>
             </a:r>
             <a:endParaRPr lang="en-US" dirty="0"/>
           </a:p>
         </p:txBody>
       </p:sp>
-      <p:sp>
-        <p:nvSpPr>
-          <p:cNvPr id="3" name="Content Placeholder 2"/>
-          <p:cNvSpPr>
-            <a:spLocks noGrp="1"/>
-          </p:cNvSpPr>
-          <p:nvPr>
-            <p:ph idx="1"/>
-          </p:nvPr>
-        </p:nvSpPr>
-        <p:spPr/>
-        <p:txBody>
-          <a:bodyPr/>
-          <a:lstStyle/>
-          <a:p>
-            <a:endParaRPr lang="en-US"/>
-          </a:p>
-        </p:txBody>
-      </p:sp>
+      <p:pic>
+        <p:nvPicPr>
+          <p:cNvPr id="2050" name="Picture 2"/>
+          <p:cNvPicPr>
+            <a:picLocks noChangeAspect="1" noChangeArrowheads="1"/>
+          </p:cNvPicPr>
+          <p:nvPr/>
+        </p:nvPicPr>
+        <p:blipFill>
+          <a:blip r:embed="rId2">
+            <a:extLst>
+              <a:ext uri="{28A0092B-C50C-407E-A947-70E740481C1C}">
+                <a14:useLocalDpi xmlns:a14="http://schemas.microsoft.com/office/drawing/2010/main" val="0"/>
+              </a:ext>
+            </a:extLst>
+          </a:blip>
+          <a:srcRect/>
+          <a:stretch>
+            <a:fillRect/>
+          </a:stretch>
+        </p:blipFill>
+        <p:spPr bwMode="auto">
+          <a:xfrm>
+            <a:off x="206062" y="1616460"/>
+            <a:ext cx="8686800" cy="2232826"/>
+          </a:xfrm>
+          <a:prstGeom prst="rect">
+            <a:avLst/>
+          </a:prstGeom>
+          <a:noFill/>
+          <a:ln>
+            <a:noFill/>
+          </a:ln>
+          <a:extLst>
+            <a:ext uri="{909E8E84-426E-40DD-AFC4-6F175D3DCCD1}">
+              <a14:hiddenFill xmlns:a14="http://schemas.microsoft.com/office/drawing/2010/main">
+                <a:solidFill>
+                  <a:schemeClr val="accent1"/>
+                </a:solidFill>
+              </a14:hiddenFill>
+            </a:ext>
+            <a:ext uri="{91240B29-F687-4F45-9708-019B960494DF}">
+              <a14:hiddenLine xmlns:a14="http://schemas.microsoft.com/office/drawing/2010/main" w="9525">
+                <a:solidFill>
+                  <a:schemeClr val="tx1"/>
+                </a:solidFill>
+                <a:miter lim="800000"/>
+                <a:headEnd/>
+                <a:tailEnd/>
+              </a14:hiddenLine>
+            </a:ext>
+          </a:extLst>
+        </p:spPr>
+      </p:pic>
+      <p:pic>
+        <p:nvPicPr>
+          <p:cNvPr id="2051" name="Picture 3"/>
+          <p:cNvPicPr>
+            <a:picLocks noChangeAspect="1" noChangeArrowheads="1"/>
+          </p:cNvPicPr>
+          <p:nvPr/>
+        </p:nvPicPr>
+        <p:blipFill>
+          <a:blip r:embed="rId3">
+            <a:extLst>
+              <a:ext uri="{28A0092B-C50C-407E-A947-70E740481C1C}">
+                <a14:useLocalDpi xmlns:a14="http://schemas.microsoft.com/office/drawing/2010/main" val="0"/>
+              </a:ext>
+            </a:extLst>
+          </a:blip>
+          <a:srcRect/>
+          <a:stretch>
+            <a:fillRect/>
+          </a:stretch>
+        </p:blipFill>
+        <p:spPr bwMode="auto">
+          <a:xfrm>
+            <a:off x="457200" y="3908242"/>
+            <a:ext cx="3674917" cy="2801305"/>
+          </a:xfrm>
+          <a:prstGeom prst="rect">
+            <a:avLst/>
+          </a:prstGeom>
+          <a:noFill/>
+          <a:ln>
+            <a:noFill/>
+          </a:ln>
+          <a:extLst>
+            <a:ext uri="{909E8E84-426E-40DD-AFC4-6F175D3DCCD1}">
+              <a14:hiddenFill xmlns:a14="http://schemas.microsoft.com/office/drawing/2010/main">
+                <a:solidFill>
+                  <a:schemeClr val="accent1"/>
+                </a:solidFill>
+              </a14:hiddenFill>
+            </a:ext>
+            <a:ext uri="{91240B29-F687-4F45-9708-019B960494DF}">
+              <a14:hiddenLine xmlns:a14="http://schemas.microsoft.com/office/drawing/2010/main" w="9525">
+                <a:solidFill>
+                  <a:schemeClr val="tx1"/>
+                </a:solidFill>
+                <a:miter lim="800000"/>
+                <a:headEnd/>
+                <a:tailEnd/>
+              </a14:hiddenLine>
+            </a:ext>
+          </a:extLst>
+        </p:spPr>
+      </p:pic>
+      <p:pic>
+        <p:nvPicPr>
+          <p:cNvPr id="2052" name="Picture 4"/>
+          <p:cNvPicPr>
+            <a:picLocks noChangeAspect="1" noChangeArrowheads="1"/>
+          </p:cNvPicPr>
+          <p:nvPr/>
+        </p:nvPicPr>
+        <p:blipFill>
+          <a:blip r:embed="rId4">
+            <a:extLst>
+              <a:ext uri="{28A0092B-C50C-407E-A947-70E740481C1C}">
+                <a14:useLocalDpi xmlns:a14="http://schemas.microsoft.com/office/drawing/2010/main" val="0"/>
+              </a:ext>
+            </a:extLst>
+          </a:blip>
+          <a:srcRect/>
+          <a:stretch>
+            <a:fillRect/>
+          </a:stretch>
+        </p:blipFill>
+        <p:spPr bwMode="auto">
+          <a:xfrm>
+            <a:off x="4833670" y="3908243"/>
+            <a:ext cx="3679265" cy="2801305"/>
+          </a:xfrm>
+          <a:prstGeom prst="rect">
+            <a:avLst/>
+          </a:prstGeom>
+          <a:noFill/>
+          <a:ln>
+            <a:noFill/>
+          </a:ln>
+          <a:extLst>
+            <a:ext uri="{909E8E84-426E-40DD-AFC4-6F175D3DCCD1}">
+              <a14:hiddenFill xmlns:a14="http://schemas.microsoft.com/office/drawing/2010/main">
+                <a:solidFill>
+                  <a:schemeClr val="accent1"/>
+                </a:solidFill>
+              </a14:hiddenFill>
+            </a:ext>
+            <a:ext uri="{91240B29-F687-4F45-9708-019B960494DF}">
+              <a14:hiddenLine xmlns:a14="http://schemas.microsoft.com/office/drawing/2010/main" w="9525">
+                <a:solidFill>
+                  <a:schemeClr val="tx1"/>
+                </a:solidFill>
+                <a:miter lim="800000"/>
+                <a:headEnd/>
+                <a:tailEnd/>
+              </a14:hiddenLine>
+            </a:ext>
+          </a:extLst>
+        </p:spPr>
+      </p:pic>
     </p:spTree>
     <p:extLst>
       <p:ext uri="{BB962C8B-B14F-4D97-AF65-F5344CB8AC3E}">
-        <p14:creationId xmlns:p14="http://schemas.microsoft.com/office/powerpoint/2010/main" val="2570634580"/>
+        <p14:creationId xmlns:p14="http://schemas.microsoft.com/office/powerpoint/2010/main" val="4248679205"/>
       </p:ext>
     </p:extLst>
   </p:cSld>
@@ -6329,7 +8485,49 @@
           <a:p>
             <a:r>
               <a:rPr lang="en-US" dirty="0" smtClean="0"/>
-              <a:t>Region Display Selector</a:t>
+              <a:t>Standard User</a:t>
+            </a:r>
+            <a:endParaRPr lang="en-US" dirty="0"/>
+          </a:p>
+        </p:txBody>
+      </p:sp>
+      <p:sp>
+        <p:nvSpPr>
+          <p:cNvPr id="3" name="Content Placeholder 2"/>
+          <p:cNvSpPr>
+            <a:spLocks noGrp="1"/>
+          </p:cNvSpPr>
+          <p:nvPr>
+            <p:ph idx="1"/>
+          </p:nvPr>
+        </p:nvSpPr>
+        <p:spPr>
+          <a:xfrm>
+            <a:off x="335566" y="1524000"/>
+            <a:ext cx="6819364" cy="681507"/>
+          </a:xfrm>
+        </p:spPr>
+        <p:txBody>
+          <a:bodyPr>
+            <a:normAutofit fontScale="85000" lnSpcReduction="20000"/>
+          </a:bodyPr>
+          <a:lstStyle/>
+          <a:p>
+            <a:pPr marL="0" indent="0">
+              <a:buNone/>
+            </a:pPr>
+            <a:r>
+              <a:rPr lang="en-US" dirty="0" smtClean="0"/>
+              <a:t>Only lists in their division</a:t>
+            </a:r>
+          </a:p>
+          <a:p>
+            <a:pPr marL="0" indent="0">
+              <a:buNone/>
+            </a:pPr>
+            <a:r>
+              <a:rPr lang="en-US" dirty="0" smtClean="0"/>
+              <a:t>No create option</a:t>
             </a:r>
             <a:endParaRPr lang="en-US" dirty="0"/>
           </a:p>
@@ -6337,13 +8535,65 @@
       </p:sp>
       <p:pic>
         <p:nvPicPr>
-          <p:cNvPr id="4" name="Content Placeholder 3" descr="Screen Shot 2015-04-28 at 5.07.32 PM.png"/>
+          <p:cNvPr id="3075" name="Picture 3"/>
           <p:cNvPicPr>
-            <a:picLocks noGrp="1" noChangeAspect="1"/>
+            <a:picLocks noChangeAspect="1" noChangeArrowheads="1"/>
           </p:cNvPicPr>
-          <p:nvPr>
-            <p:ph idx="1"/>
-          </p:nvPr>
+          <p:nvPr/>
+        </p:nvPicPr>
+        <p:blipFill>
+          <a:blip r:embed="rId2">
+            <a:extLst>
+              <a:ext uri="{28A0092B-C50C-407E-A947-70E740481C1C}">
+                <a14:useLocalDpi xmlns:a14="http://schemas.microsoft.com/office/drawing/2010/main" val="0"/>
+              </a:ext>
+            </a:extLst>
+          </a:blip>
+          <a:srcRect/>
+          <a:stretch>
+            <a:fillRect/>
+          </a:stretch>
+        </p:blipFill>
+        <p:spPr bwMode="auto">
+          <a:xfrm>
+            <a:off x="335566" y="2339253"/>
+            <a:ext cx="8351234" cy="986401"/>
+          </a:xfrm>
+          <a:prstGeom prst="rect">
+            <a:avLst/>
+          </a:prstGeom>
+          <a:noFill/>
+          <a:ln>
+            <a:noFill/>
+          </a:ln>
+          <a:extLst>
+            <a:ext uri="{909E8E84-426E-40DD-AFC4-6F175D3DCCD1}">
+              <a14:hiddenFill xmlns:a14="http://schemas.microsoft.com/office/drawing/2010/main">
+                <a:solidFill>
+                  <a:schemeClr val="accent1"/>
+                </a:solidFill>
+              </a14:hiddenFill>
+            </a:ext>
+            <a:ext uri="{91240B29-F687-4F45-9708-019B960494DF}">
+              <a14:hiddenLine xmlns:a14="http://schemas.microsoft.com/office/drawing/2010/main" w="9525">
+                <a:solidFill>
+                  <a:schemeClr val="tx1"/>
+                </a:solidFill>
+                <a:miter lim="800000"/>
+                <a:headEnd/>
+                <a:tailEnd/>
+              </a14:hiddenLine>
+            </a:ext>
+          </a:extLst>
+        </p:spPr>
+      </p:pic>
+      <p:pic>
+        <p:nvPicPr>
+          <p:cNvPr id="3076" name="Picture 4"/>
+          <p:cNvPicPr>
+            <a:picLocks noChangeAspect="1" noChangeArrowheads="1"/>
+          </p:cNvPicPr>
+          <p:nvPr/>
         </p:nvPicPr>
         <p:blipFill>
           <a:blip r:embed="rId3">
@@ -6353,67 +8603,48 @@
               </a:ext>
             </a:extLst>
           </a:blip>
-          <a:srcRect t="-11550" b="-11550"/>
+          <a:srcRect/>
           <a:stretch>
             <a:fillRect/>
           </a:stretch>
         </p:blipFill>
-        <p:spPr/>
-      </p:pic>
-      <p:sp>
-        <p:nvSpPr>
-          <p:cNvPr id="5" name="Donut 4"/>
-          <p:cNvSpPr/>
-          <p:nvPr/>
-        </p:nvSpPr>
-        <p:spPr>
+        <p:spPr bwMode="auto">
           <a:xfrm>
-            <a:off x="191833" y="2348910"/>
-            <a:ext cx="3448834" cy="817624"/>
+            <a:off x="285750" y="3475424"/>
+            <a:ext cx="4225433" cy="3225414"/>
           </a:xfrm>
-          <a:prstGeom prst="donut">
-            <a:avLst>
-              <a:gd name="adj" fmla="val 7435"/>
-            </a:avLst>
+          <a:prstGeom prst="rect">
+            <a:avLst/>
           </a:prstGeom>
-          <a:solidFill>
-            <a:schemeClr val="tx1"/>
-          </a:solidFill>
+          <a:noFill/>
           <a:ln>
             <a:noFill/>
           </a:ln>
+          <a:extLst>
+            <a:ext uri="{909E8E84-426E-40DD-AFC4-6F175D3DCCD1}">
+              <a14:hiddenFill xmlns:a14="http://schemas.microsoft.com/office/drawing/2010/main">
+                <a:solidFill>
+                  <a:schemeClr val="accent1"/>
+                </a:solidFill>
+              </a14:hiddenFill>
+            </a:ext>
+            <a:ext uri="{91240B29-F687-4F45-9708-019B960494DF}">
+              <a14:hiddenLine xmlns:a14="http://schemas.microsoft.com/office/drawing/2010/main" w="9525">
+                <a:solidFill>
+                  <a:schemeClr val="tx1"/>
+                </a:solidFill>
+                <a:miter lim="800000"/>
+                <a:headEnd/>
+                <a:tailEnd/>
+              </a14:hiddenLine>
+            </a:ext>
+          </a:extLst>
         </p:spPr>
-        <p:style>
-          <a:lnRef idx="1">
-            <a:schemeClr val="accent1"/>
-          </a:lnRef>
-          <a:fillRef idx="3">
-            <a:schemeClr val="accent1"/>
-          </a:fillRef>
-          <a:effectRef idx="2">
-            <a:schemeClr val="accent1"/>
-          </a:effectRef>
-          <a:fontRef idx="minor">
-            <a:schemeClr val="lt1"/>
-          </a:fontRef>
-        </p:style>
-        <p:txBody>
-          <a:bodyPr rtlCol="0" anchor="ctr"/>
-          <a:lstStyle/>
-          <a:p>
-            <a:pPr algn="ctr"/>
-            <a:endParaRPr lang="en-US">
-              <a:solidFill>
-                <a:schemeClr val="tx1"/>
-              </a:solidFill>
-            </a:endParaRPr>
-          </a:p>
-        </p:txBody>
-      </p:sp>
+      </p:pic>
     </p:spTree>
     <p:extLst>
       <p:ext uri="{BB962C8B-B14F-4D97-AF65-F5344CB8AC3E}">
-        <p14:creationId xmlns:p14="http://schemas.microsoft.com/office/powerpoint/2010/main" val="1303049864"/>
+        <p14:creationId xmlns:p14="http://schemas.microsoft.com/office/powerpoint/2010/main" val="151221812"/>
       </p:ext>
     </p:extLst>
   </p:cSld>

</xml_diff>